<commit_message>
pushing updated google slides presentation as PPT
</commit_message>
<xml_diff>
--- a/Final Project Google Slides.pptx
+++ b/Final Project Google Slides.pptx
@@ -5,7 +5,7 @@
     <p:sldMasterId id="2147483659" r:id="rId1"/>
   </p:sldMasterIdLst>
   <p:notesMasterIdLst>
-    <p:notesMasterId r:id="rId14"/>
+    <p:notesMasterId r:id="rId24"/>
   </p:notesMasterIdLst>
   <p:sldIdLst>
     <p:sldId id="256" r:id="rId2"/>
@@ -20,21 +20,31 @@
     <p:sldId id="265" r:id="rId11"/>
     <p:sldId id="266" r:id="rId12"/>
     <p:sldId id="267" r:id="rId13"/>
+    <p:sldId id="268" r:id="rId14"/>
+    <p:sldId id="269" r:id="rId15"/>
+    <p:sldId id="270" r:id="rId16"/>
+    <p:sldId id="271" r:id="rId17"/>
+    <p:sldId id="272" r:id="rId18"/>
+    <p:sldId id="273" r:id="rId19"/>
+    <p:sldId id="274" r:id="rId20"/>
+    <p:sldId id="275" r:id="rId21"/>
+    <p:sldId id="276" r:id="rId22"/>
+    <p:sldId id="277" r:id="rId23"/>
   </p:sldIdLst>
   <p:sldSz cx="9144000" cy="5143500" type="screen16x9"/>
   <p:notesSz cx="6858000" cy="9144000"/>
   <p:embeddedFontLst>
     <p:embeddedFont>
       <p:font typeface="Maven Pro" panose="020B0604020202020204" charset="0"/>
-      <p:regular r:id="rId15"/>
-      <p:bold r:id="rId16"/>
+      <p:regular r:id="rId25"/>
+      <p:bold r:id="rId26"/>
     </p:embeddedFont>
     <p:embeddedFont>
       <p:font typeface="Nunito" pitchFamily="2" charset="0"/>
-      <p:regular r:id="rId17"/>
-      <p:bold r:id="rId18"/>
-      <p:italic r:id="rId19"/>
-      <p:boldItalic r:id="rId20"/>
+      <p:regular r:id="rId27"/>
+      <p:bold r:id="rId28"/>
+      <p:italic r:id="rId29"/>
+      <p:boldItalic r:id="rId30"/>
     </p:embeddedFont>
   </p:embeddedFontLst>
   <p:defaultTextStyle>
@@ -835,7 +845,7 @@
   <p:cSld>
     <p:spTree>
       <p:nvGrpSpPr>
-        <p:cNvPr id="1" name="Shape 332"/>
+        <p:cNvPr id="1" name="Shape 335"/>
         <p:cNvGrpSpPr/>
         <p:nvPr/>
       </p:nvGrpSpPr>
@@ -849,7 +859,7 @@
       </p:grpSpPr>
       <p:sp>
         <p:nvSpPr>
-          <p:cNvPr id="333" name="Google Shape;333;g1156f46ef80_0_315:notes"/>
+          <p:cNvPr id="336" name="Google Shape;336;g1156f46ef80_0_305:notes"/>
           <p:cNvSpPr>
             <a:spLocks noGrp="1" noRot="1" noChangeAspect="1"/>
           </p:cNvSpPr>
@@ -890,7 +900,7 @@
       </p:sp>
       <p:sp>
         <p:nvSpPr>
-          <p:cNvPr id="334" name="Google Shape;334;g1156f46ef80_0_315:notes"/>
+          <p:cNvPr id="337" name="Google Shape;337;g1156f46ef80_0_305:notes"/>
           <p:cNvSpPr txBox="1">
             <a:spLocks noGrp="1"/>
           </p:cNvSpPr>
@@ -939,7 +949,7 @@
   <p:cSld>
     <p:spTree>
       <p:nvGrpSpPr>
-        <p:cNvPr id="1" name="Shape 338"/>
+        <p:cNvPr id="1" name="Shape 341"/>
         <p:cNvGrpSpPr/>
         <p:nvPr/>
       </p:nvGrpSpPr>
@@ -953,7 +963,7 @@
       </p:grpSpPr>
       <p:sp>
         <p:nvSpPr>
-          <p:cNvPr id="339" name="Google Shape;339;g1156f46ef80_0_320:notes"/>
+          <p:cNvPr id="342" name="Google Shape;342;g1156f46ef80_0_310:notes"/>
           <p:cNvSpPr>
             <a:spLocks noGrp="1" noRot="1" noChangeAspect="1"/>
           </p:cNvSpPr>
@@ -994,7 +1004,7 @@
       </p:sp>
       <p:sp>
         <p:nvSpPr>
-          <p:cNvPr id="340" name="Google Shape;340;g1156f46ef80_0_320:notes"/>
+          <p:cNvPr id="343" name="Google Shape;343;g1156f46ef80_0_310:notes"/>
           <p:cNvSpPr txBox="1">
             <a:spLocks noGrp="1"/>
           </p:cNvSpPr>
@@ -1043,7 +1053,7 @@
   <p:cSld>
     <p:spTree>
       <p:nvGrpSpPr>
-        <p:cNvPr id="1" name="Shape 345"/>
+        <p:cNvPr id="1" name="Shape 347"/>
         <p:cNvGrpSpPr/>
         <p:nvPr/>
       </p:nvGrpSpPr>
@@ -1057,7 +1067,7 @@
       </p:grpSpPr>
       <p:sp>
         <p:nvSpPr>
-          <p:cNvPr id="346" name="Google Shape;346;g1156f46ef80_0_326:notes"/>
+          <p:cNvPr id="348" name="Google Shape;348;g1156f46ef80_0_315:notes"/>
           <p:cNvSpPr>
             <a:spLocks noGrp="1" noRot="1" noChangeAspect="1"/>
           </p:cNvSpPr>
@@ -1098,7 +1108,735 @@
       </p:sp>
       <p:sp>
         <p:nvSpPr>
-          <p:cNvPr id="347" name="Google Shape;347;g1156f46ef80_0_326:notes"/>
+          <p:cNvPr id="349" name="Google Shape;349;g1156f46ef80_0_315:notes"/>
+          <p:cNvSpPr txBox="1">
+            <a:spLocks noGrp="1"/>
+          </p:cNvSpPr>
+          <p:nvPr>
+            <p:ph type="body" idx="1"/>
+          </p:nvPr>
+        </p:nvSpPr>
+        <p:spPr>
+          <a:xfrm>
+            <a:off x="685800" y="4343400"/>
+            <a:ext cx="5486400" cy="4114800"/>
+          </a:xfrm>
+          <a:prstGeom prst="rect">
+            <a:avLst/>
+          </a:prstGeom>
+        </p:spPr>
+        <p:txBody>
+          <a:bodyPr spcFirstLastPara="1" wrap="square" lIns="91425" tIns="91425" rIns="91425" bIns="91425" anchor="t" anchorCtr="0">
+            <a:noAutofit/>
+          </a:bodyPr>
+          <a:lstStyle/>
+          <a:p>
+            <a:pPr marL="0" lvl="0" indent="0" algn="l" rtl="0">
+              <a:spcBef>
+                <a:spcPts val="0"/>
+              </a:spcBef>
+              <a:spcAft>
+                <a:spcPts val="0"/>
+              </a:spcAft>
+              <a:buNone/>
+            </a:pPr>
+            <a:endParaRPr/>
+          </a:p>
+        </p:txBody>
+      </p:sp>
+    </p:spTree>
+  </p:cSld>
+  <p:clrMapOvr>
+    <a:masterClrMapping/>
+  </p:clrMapOvr>
+</p:notes>
+</file>
+
+<file path=ppt/notesSlides/notesSlide13.xml><?xml version="1.0" encoding="utf-8"?>
+<p:notes xmlns:a="http://schemas.openxmlformats.org/drawingml/2006/main" xmlns:r="http://schemas.openxmlformats.org/officeDocument/2006/relationships" xmlns:p="http://schemas.openxmlformats.org/presentationml/2006/main" showMasterSp="0" showMasterPhAnim="0">
+  <p:cSld>
+    <p:spTree>
+      <p:nvGrpSpPr>
+        <p:cNvPr id="1" name="Shape 353"/>
+        <p:cNvGrpSpPr/>
+        <p:nvPr/>
+      </p:nvGrpSpPr>
+      <p:grpSpPr>
+        <a:xfrm>
+          <a:off x="0" y="0"/>
+          <a:ext cx="0" cy="0"/>
+          <a:chOff x="0" y="0"/>
+          <a:chExt cx="0" cy="0"/>
+        </a:xfrm>
+      </p:grpSpPr>
+      <p:sp>
+        <p:nvSpPr>
+          <p:cNvPr id="354" name="Google Shape;354;g1156f46ef80_0_320:notes"/>
+          <p:cNvSpPr>
+            <a:spLocks noGrp="1" noRot="1" noChangeAspect="1"/>
+          </p:cNvSpPr>
+          <p:nvPr>
+            <p:ph type="sldImg" idx="2"/>
+          </p:nvPr>
+        </p:nvSpPr>
+        <p:spPr>
+          <a:xfrm>
+            <a:off x="381300" y="685800"/>
+            <a:ext cx="6096000" cy="3429000"/>
+          </a:xfrm>
+          <a:custGeom>
+            <a:avLst/>
+            <a:gdLst/>
+            <a:ahLst/>
+            <a:cxnLst/>
+            <a:rect l="l" t="t" r="r" b="b"/>
+            <a:pathLst>
+              <a:path w="120000" h="120000" extrusionOk="0">
+                <a:moveTo>
+                  <a:pt x="0" y="0"/>
+                </a:moveTo>
+                <a:lnTo>
+                  <a:pt x="120000" y="0"/>
+                </a:lnTo>
+                <a:lnTo>
+                  <a:pt x="120000" y="120000"/>
+                </a:lnTo>
+                <a:lnTo>
+                  <a:pt x="0" y="120000"/>
+                </a:lnTo>
+                <a:close/>
+              </a:path>
+            </a:pathLst>
+          </a:custGeom>
+        </p:spPr>
+      </p:sp>
+      <p:sp>
+        <p:nvSpPr>
+          <p:cNvPr id="355" name="Google Shape;355;g1156f46ef80_0_320:notes"/>
+          <p:cNvSpPr txBox="1">
+            <a:spLocks noGrp="1"/>
+          </p:cNvSpPr>
+          <p:nvPr>
+            <p:ph type="body" idx="1"/>
+          </p:nvPr>
+        </p:nvSpPr>
+        <p:spPr>
+          <a:xfrm>
+            <a:off x="685800" y="4343400"/>
+            <a:ext cx="5486400" cy="4114800"/>
+          </a:xfrm>
+          <a:prstGeom prst="rect">
+            <a:avLst/>
+          </a:prstGeom>
+        </p:spPr>
+        <p:txBody>
+          <a:bodyPr spcFirstLastPara="1" wrap="square" lIns="91425" tIns="91425" rIns="91425" bIns="91425" anchor="t" anchorCtr="0">
+            <a:noAutofit/>
+          </a:bodyPr>
+          <a:lstStyle/>
+          <a:p>
+            <a:pPr marL="0" lvl="0" indent="0" algn="l" rtl="0">
+              <a:spcBef>
+                <a:spcPts val="0"/>
+              </a:spcBef>
+              <a:spcAft>
+                <a:spcPts val="0"/>
+              </a:spcAft>
+              <a:buNone/>
+            </a:pPr>
+            <a:endParaRPr/>
+          </a:p>
+        </p:txBody>
+      </p:sp>
+    </p:spTree>
+  </p:cSld>
+  <p:clrMapOvr>
+    <a:masterClrMapping/>
+  </p:clrMapOvr>
+</p:notes>
+</file>
+
+<file path=ppt/notesSlides/notesSlide14.xml><?xml version="1.0" encoding="utf-8"?>
+<p:notes xmlns:a="http://schemas.openxmlformats.org/drawingml/2006/main" xmlns:r="http://schemas.openxmlformats.org/officeDocument/2006/relationships" xmlns:p="http://schemas.openxmlformats.org/presentationml/2006/main" showMasterSp="0" showMasterPhAnim="0">
+  <p:cSld>
+    <p:spTree>
+      <p:nvGrpSpPr>
+        <p:cNvPr id="1" name="Shape 359"/>
+        <p:cNvGrpSpPr/>
+        <p:nvPr/>
+      </p:nvGrpSpPr>
+      <p:grpSpPr>
+        <a:xfrm>
+          <a:off x="0" y="0"/>
+          <a:ext cx="0" cy="0"/>
+          <a:chOff x="0" y="0"/>
+          <a:chExt cx="0" cy="0"/>
+        </a:xfrm>
+      </p:grpSpPr>
+      <p:sp>
+        <p:nvSpPr>
+          <p:cNvPr id="360" name="Google Shape;360;g1156f46ef80_0_326:notes"/>
+          <p:cNvSpPr>
+            <a:spLocks noGrp="1" noRot="1" noChangeAspect="1"/>
+          </p:cNvSpPr>
+          <p:nvPr>
+            <p:ph type="sldImg" idx="2"/>
+          </p:nvPr>
+        </p:nvSpPr>
+        <p:spPr>
+          <a:xfrm>
+            <a:off x="381300" y="685800"/>
+            <a:ext cx="6096000" cy="3429000"/>
+          </a:xfrm>
+          <a:custGeom>
+            <a:avLst/>
+            <a:gdLst/>
+            <a:ahLst/>
+            <a:cxnLst/>
+            <a:rect l="l" t="t" r="r" b="b"/>
+            <a:pathLst>
+              <a:path w="120000" h="120000" extrusionOk="0">
+                <a:moveTo>
+                  <a:pt x="0" y="0"/>
+                </a:moveTo>
+                <a:lnTo>
+                  <a:pt x="120000" y="0"/>
+                </a:lnTo>
+                <a:lnTo>
+                  <a:pt x="120000" y="120000"/>
+                </a:lnTo>
+                <a:lnTo>
+                  <a:pt x="0" y="120000"/>
+                </a:lnTo>
+                <a:close/>
+              </a:path>
+            </a:pathLst>
+          </a:custGeom>
+        </p:spPr>
+      </p:sp>
+      <p:sp>
+        <p:nvSpPr>
+          <p:cNvPr id="361" name="Google Shape;361;g1156f46ef80_0_326:notes"/>
+          <p:cNvSpPr txBox="1">
+            <a:spLocks noGrp="1"/>
+          </p:cNvSpPr>
+          <p:nvPr>
+            <p:ph type="body" idx="1"/>
+          </p:nvPr>
+        </p:nvSpPr>
+        <p:spPr>
+          <a:xfrm>
+            <a:off x="685800" y="4343400"/>
+            <a:ext cx="5486400" cy="4114800"/>
+          </a:xfrm>
+          <a:prstGeom prst="rect">
+            <a:avLst/>
+          </a:prstGeom>
+        </p:spPr>
+        <p:txBody>
+          <a:bodyPr spcFirstLastPara="1" wrap="square" lIns="91425" tIns="91425" rIns="91425" bIns="91425" anchor="t" anchorCtr="0">
+            <a:noAutofit/>
+          </a:bodyPr>
+          <a:lstStyle/>
+          <a:p>
+            <a:pPr marL="0" lvl="0" indent="0" algn="l" rtl="0">
+              <a:spcBef>
+                <a:spcPts val="0"/>
+              </a:spcBef>
+              <a:spcAft>
+                <a:spcPts val="0"/>
+              </a:spcAft>
+              <a:buNone/>
+            </a:pPr>
+            <a:endParaRPr/>
+          </a:p>
+        </p:txBody>
+      </p:sp>
+    </p:spTree>
+  </p:cSld>
+  <p:clrMapOvr>
+    <a:masterClrMapping/>
+  </p:clrMapOvr>
+</p:notes>
+</file>
+
+<file path=ppt/notesSlides/notesSlide15.xml><?xml version="1.0" encoding="utf-8"?>
+<p:notes xmlns:a="http://schemas.openxmlformats.org/drawingml/2006/main" xmlns:r="http://schemas.openxmlformats.org/officeDocument/2006/relationships" xmlns:p="http://schemas.openxmlformats.org/presentationml/2006/main" showMasterSp="0" showMasterPhAnim="0">
+  <p:cSld>
+    <p:spTree>
+      <p:nvGrpSpPr>
+        <p:cNvPr id="1" name="Shape 365"/>
+        <p:cNvGrpSpPr/>
+        <p:nvPr/>
+      </p:nvGrpSpPr>
+      <p:grpSpPr>
+        <a:xfrm>
+          <a:off x="0" y="0"/>
+          <a:ext cx="0" cy="0"/>
+          <a:chOff x="0" y="0"/>
+          <a:chExt cx="0" cy="0"/>
+        </a:xfrm>
+      </p:grpSpPr>
+      <p:sp>
+        <p:nvSpPr>
+          <p:cNvPr id="366" name="Google Shape;366;g11771f64633_0_26:notes"/>
+          <p:cNvSpPr>
+            <a:spLocks noGrp="1" noRot="1" noChangeAspect="1"/>
+          </p:cNvSpPr>
+          <p:nvPr>
+            <p:ph type="sldImg" idx="2"/>
+          </p:nvPr>
+        </p:nvSpPr>
+        <p:spPr>
+          <a:xfrm>
+            <a:off x="381300" y="685800"/>
+            <a:ext cx="6096000" cy="3429000"/>
+          </a:xfrm>
+          <a:custGeom>
+            <a:avLst/>
+            <a:gdLst/>
+            <a:ahLst/>
+            <a:cxnLst/>
+            <a:rect l="l" t="t" r="r" b="b"/>
+            <a:pathLst>
+              <a:path w="120000" h="120000" extrusionOk="0">
+                <a:moveTo>
+                  <a:pt x="0" y="0"/>
+                </a:moveTo>
+                <a:lnTo>
+                  <a:pt x="120000" y="0"/>
+                </a:lnTo>
+                <a:lnTo>
+                  <a:pt x="120000" y="120000"/>
+                </a:lnTo>
+                <a:lnTo>
+                  <a:pt x="0" y="120000"/>
+                </a:lnTo>
+                <a:close/>
+              </a:path>
+            </a:pathLst>
+          </a:custGeom>
+        </p:spPr>
+      </p:sp>
+      <p:sp>
+        <p:nvSpPr>
+          <p:cNvPr id="367" name="Google Shape;367;g11771f64633_0_26:notes"/>
+          <p:cNvSpPr txBox="1">
+            <a:spLocks noGrp="1"/>
+          </p:cNvSpPr>
+          <p:nvPr>
+            <p:ph type="body" idx="1"/>
+          </p:nvPr>
+        </p:nvSpPr>
+        <p:spPr>
+          <a:xfrm>
+            <a:off x="685800" y="4343400"/>
+            <a:ext cx="5486400" cy="4114800"/>
+          </a:xfrm>
+          <a:prstGeom prst="rect">
+            <a:avLst/>
+          </a:prstGeom>
+        </p:spPr>
+        <p:txBody>
+          <a:bodyPr spcFirstLastPara="1" wrap="square" lIns="91425" tIns="91425" rIns="91425" bIns="91425" anchor="t" anchorCtr="0">
+            <a:noAutofit/>
+          </a:bodyPr>
+          <a:lstStyle/>
+          <a:p>
+            <a:pPr marL="0" lvl="0" indent="0" algn="l" rtl="0">
+              <a:spcBef>
+                <a:spcPts val="0"/>
+              </a:spcBef>
+              <a:spcAft>
+                <a:spcPts val="0"/>
+              </a:spcAft>
+              <a:buNone/>
+            </a:pPr>
+            <a:endParaRPr/>
+          </a:p>
+        </p:txBody>
+      </p:sp>
+    </p:spTree>
+  </p:cSld>
+  <p:clrMapOvr>
+    <a:masterClrMapping/>
+  </p:clrMapOvr>
+</p:notes>
+</file>
+
+<file path=ppt/notesSlides/notesSlide16.xml><?xml version="1.0" encoding="utf-8"?>
+<p:notes xmlns:a="http://schemas.openxmlformats.org/drawingml/2006/main" xmlns:r="http://schemas.openxmlformats.org/officeDocument/2006/relationships" xmlns:p="http://schemas.openxmlformats.org/presentationml/2006/main" showMasterSp="0" showMasterPhAnim="0">
+  <p:cSld>
+    <p:spTree>
+      <p:nvGrpSpPr>
+        <p:cNvPr id="1" name="Shape 371"/>
+        <p:cNvGrpSpPr/>
+        <p:nvPr/>
+      </p:nvGrpSpPr>
+      <p:grpSpPr>
+        <a:xfrm>
+          <a:off x="0" y="0"/>
+          <a:ext cx="0" cy="0"/>
+          <a:chOff x="0" y="0"/>
+          <a:chExt cx="0" cy="0"/>
+        </a:xfrm>
+      </p:grpSpPr>
+      <p:sp>
+        <p:nvSpPr>
+          <p:cNvPr id="372" name="Google Shape;372;g11771f64633_0_68:notes"/>
+          <p:cNvSpPr>
+            <a:spLocks noGrp="1" noRot="1" noChangeAspect="1"/>
+          </p:cNvSpPr>
+          <p:nvPr>
+            <p:ph type="sldImg" idx="2"/>
+          </p:nvPr>
+        </p:nvSpPr>
+        <p:spPr>
+          <a:xfrm>
+            <a:off x="381300" y="685800"/>
+            <a:ext cx="6096000" cy="3429000"/>
+          </a:xfrm>
+          <a:custGeom>
+            <a:avLst/>
+            <a:gdLst/>
+            <a:ahLst/>
+            <a:cxnLst/>
+            <a:rect l="l" t="t" r="r" b="b"/>
+            <a:pathLst>
+              <a:path w="120000" h="120000" extrusionOk="0">
+                <a:moveTo>
+                  <a:pt x="0" y="0"/>
+                </a:moveTo>
+                <a:lnTo>
+                  <a:pt x="120000" y="0"/>
+                </a:lnTo>
+                <a:lnTo>
+                  <a:pt x="120000" y="120000"/>
+                </a:lnTo>
+                <a:lnTo>
+                  <a:pt x="0" y="120000"/>
+                </a:lnTo>
+                <a:close/>
+              </a:path>
+            </a:pathLst>
+          </a:custGeom>
+        </p:spPr>
+      </p:sp>
+      <p:sp>
+        <p:nvSpPr>
+          <p:cNvPr id="373" name="Google Shape;373;g11771f64633_0_68:notes"/>
+          <p:cNvSpPr txBox="1">
+            <a:spLocks noGrp="1"/>
+          </p:cNvSpPr>
+          <p:nvPr>
+            <p:ph type="body" idx="1"/>
+          </p:nvPr>
+        </p:nvSpPr>
+        <p:spPr>
+          <a:xfrm>
+            <a:off x="685800" y="4343400"/>
+            <a:ext cx="5486400" cy="4114800"/>
+          </a:xfrm>
+          <a:prstGeom prst="rect">
+            <a:avLst/>
+          </a:prstGeom>
+        </p:spPr>
+        <p:txBody>
+          <a:bodyPr spcFirstLastPara="1" wrap="square" lIns="91425" tIns="91425" rIns="91425" bIns="91425" anchor="t" anchorCtr="0">
+            <a:noAutofit/>
+          </a:bodyPr>
+          <a:lstStyle/>
+          <a:p>
+            <a:pPr marL="0" lvl="0" indent="0" algn="l" rtl="0">
+              <a:spcBef>
+                <a:spcPts val="0"/>
+              </a:spcBef>
+              <a:spcAft>
+                <a:spcPts val="0"/>
+              </a:spcAft>
+              <a:buNone/>
+            </a:pPr>
+            <a:endParaRPr/>
+          </a:p>
+        </p:txBody>
+      </p:sp>
+    </p:spTree>
+  </p:cSld>
+  <p:clrMapOvr>
+    <a:masterClrMapping/>
+  </p:clrMapOvr>
+</p:notes>
+</file>
+
+<file path=ppt/notesSlides/notesSlide17.xml><?xml version="1.0" encoding="utf-8"?>
+<p:notes xmlns:a="http://schemas.openxmlformats.org/drawingml/2006/main" xmlns:r="http://schemas.openxmlformats.org/officeDocument/2006/relationships" xmlns:p="http://schemas.openxmlformats.org/presentationml/2006/main" showMasterSp="0" showMasterPhAnim="0">
+  <p:cSld>
+    <p:spTree>
+      <p:nvGrpSpPr>
+        <p:cNvPr id="1" name="Shape 377"/>
+        <p:cNvGrpSpPr/>
+        <p:nvPr/>
+      </p:nvGrpSpPr>
+      <p:grpSpPr>
+        <a:xfrm>
+          <a:off x="0" y="0"/>
+          <a:ext cx="0" cy="0"/>
+          <a:chOff x="0" y="0"/>
+          <a:chExt cx="0" cy="0"/>
+        </a:xfrm>
+      </p:grpSpPr>
+      <p:sp>
+        <p:nvSpPr>
+          <p:cNvPr id="378" name="Google Shape;378;g11771f64633_0_33:notes"/>
+          <p:cNvSpPr>
+            <a:spLocks noGrp="1" noRot="1" noChangeAspect="1"/>
+          </p:cNvSpPr>
+          <p:nvPr>
+            <p:ph type="sldImg" idx="2"/>
+          </p:nvPr>
+        </p:nvSpPr>
+        <p:spPr>
+          <a:xfrm>
+            <a:off x="381300" y="685800"/>
+            <a:ext cx="6096000" cy="3429000"/>
+          </a:xfrm>
+          <a:custGeom>
+            <a:avLst/>
+            <a:gdLst/>
+            <a:ahLst/>
+            <a:cxnLst/>
+            <a:rect l="l" t="t" r="r" b="b"/>
+            <a:pathLst>
+              <a:path w="120000" h="120000" extrusionOk="0">
+                <a:moveTo>
+                  <a:pt x="0" y="0"/>
+                </a:moveTo>
+                <a:lnTo>
+                  <a:pt x="120000" y="0"/>
+                </a:lnTo>
+                <a:lnTo>
+                  <a:pt x="120000" y="120000"/>
+                </a:lnTo>
+                <a:lnTo>
+                  <a:pt x="0" y="120000"/>
+                </a:lnTo>
+                <a:close/>
+              </a:path>
+            </a:pathLst>
+          </a:custGeom>
+        </p:spPr>
+      </p:sp>
+      <p:sp>
+        <p:nvSpPr>
+          <p:cNvPr id="379" name="Google Shape;379;g11771f64633_0_33:notes"/>
+          <p:cNvSpPr txBox="1">
+            <a:spLocks noGrp="1"/>
+          </p:cNvSpPr>
+          <p:nvPr>
+            <p:ph type="body" idx="1"/>
+          </p:nvPr>
+        </p:nvSpPr>
+        <p:spPr>
+          <a:xfrm>
+            <a:off x="685800" y="4343400"/>
+            <a:ext cx="5486400" cy="4114800"/>
+          </a:xfrm>
+          <a:prstGeom prst="rect">
+            <a:avLst/>
+          </a:prstGeom>
+        </p:spPr>
+        <p:txBody>
+          <a:bodyPr spcFirstLastPara="1" wrap="square" lIns="91425" tIns="91425" rIns="91425" bIns="91425" anchor="t" anchorCtr="0">
+            <a:noAutofit/>
+          </a:bodyPr>
+          <a:lstStyle/>
+          <a:p>
+            <a:pPr marL="0" lvl="0" indent="0" algn="l" rtl="0">
+              <a:spcBef>
+                <a:spcPts val="0"/>
+              </a:spcBef>
+              <a:spcAft>
+                <a:spcPts val="0"/>
+              </a:spcAft>
+              <a:buNone/>
+            </a:pPr>
+            <a:endParaRPr/>
+          </a:p>
+        </p:txBody>
+      </p:sp>
+    </p:spTree>
+  </p:cSld>
+  <p:clrMapOvr>
+    <a:masterClrMapping/>
+  </p:clrMapOvr>
+</p:notes>
+</file>
+
+<file path=ppt/notesSlides/notesSlide18.xml><?xml version="1.0" encoding="utf-8"?>
+<p:notes xmlns:a="http://schemas.openxmlformats.org/drawingml/2006/main" xmlns:r="http://schemas.openxmlformats.org/officeDocument/2006/relationships" xmlns:p="http://schemas.openxmlformats.org/presentationml/2006/main" showMasterSp="0" showMasterPhAnim="0">
+  <p:cSld>
+    <p:spTree>
+      <p:nvGrpSpPr>
+        <p:cNvPr id="1" name="Shape 383"/>
+        <p:cNvGrpSpPr/>
+        <p:nvPr/>
+      </p:nvGrpSpPr>
+      <p:grpSpPr>
+        <a:xfrm>
+          <a:off x="0" y="0"/>
+          <a:ext cx="0" cy="0"/>
+          <a:chOff x="0" y="0"/>
+          <a:chExt cx="0" cy="0"/>
+        </a:xfrm>
+      </p:grpSpPr>
+      <p:sp>
+        <p:nvSpPr>
+          <p:cNvPr id="384" name="Google Shape;384;g11771f64633_0_39:notes"/>
+          <p:cNvSpPr>
+            <a:spLocks noGrp="1" noRot="1" noChangeAspect="1"/>
+          </p:cNvSpPr>
+          <p:nvPr>
+            <p:ph type="sldImg" idx="2"/>
+          </p:nvPr>
+        </p:nvSpPr>
+        <p:spPr>
+          <a:xfrm>
+            <a:off x="381300" y="685800"/>
+            <a:ext cx="6096000" cy="3429000"/>
+          </a:xfrm>
+          <a:custGeom>
+            <a:avLst/>
+            <a:gdLst/>
+            <a:ahLst/>
+            <a:cxnLst/>
+            <a:rect l="l" t="t" r="r" b="b"/>
+            <a:pathLst>
+              <a:path w="120000" h="120000" extrusionOk="0">
+                <a:moveTo>
+                  <a:pt x="0" y="0"/>
+                </a:moveTo>
+                <a:lnTo>
+                  <a:pt x="120000" y="0"/>
+                </a:lnTo>
+                <a:lnTo>
+                  <a:pt x="120000" y="120000"/>
+                </a:lnTo>
+                <a:lnTo>
+                  <a:pt x="0" y="120000"/>
+                </a:lnTo>
+                <a:close/>
+              </a:path>
+            </a:pathLst>
+          </a:custGeom>
+        </p:spPr>
+      </p:sp>
+      <p:sp>
+        <p:nvSpPr>
+          <p:cNvPr id="385" name="Google Shape;385;g11771f64633_0_39:notes"/>
+          <p:cNvSpPr txBox="1">
+            <a:spLocks noGrp="1"/>
+          </p:cNvSpPr>
+          <p:nvPr>
+            <p:ph type="body" idx="1"/>
+          </p:nvPr>
+        </p:nvSpPr>
+        <p:spPr>
+          <a:xfrm>
+            <a:off x="685800" y="4343400"/>
+            <a:ext cx="5486400" cy="4114800"/>
+          </a:xfrm>
+          <a:prstGeom prst="rect">
+            <a:avLst/>
+          </a:prstGeom>
+        </p:spPr>
+        <p:txBody>
+          <a:bodyPr spcFirstLastPara="1" wrap="square" lIns="91425" tIns="91425" rIns="91425" bIns="91425" anchor="t" anchorCtr="0">
+            <a:noAutofit/>
+          </a:bodyPr>
+          <a:lstStyle/>
+          <a:p>
+            <a:pPr marL="0" lvl="0" indent="0" algn="l" rtl="0">
+              <a:spcBef>
+                <a:spcPts val="0"/>
+              </a:spcBef>
+              <a:spcAft>
+                <a:spcPts val="0"/>
+              </a:spcAft>
+              <a:buNone/>
+            </a:pPr>
+            <a:endParaRPr/>
+          </a:p>
+        </p:txBody>
+      </p:sp>
+    </p:spTree>
+  </p:cSld>
+  <p:clrMapOvr>
+    <a:masterClrMapping/>
+  </p:clrMapOvr>
+</p:notes>
+</file>
+
+<file path=ppt/notesSlides/notesSlide19.xml><?xml version="1.0" encoding="utf-8"?>
+<p:notes xmlns:a="http://schemas.openxmlformats.org/drawingml/2006/main" xmlns:r="http://schemas.openxmlformats.org/officeDocument/2006/relationships" xmlns:p="http://schemas.openxmlformats.org/presentationml/2006/main" showMasterSp="0" showMasterPhAnim="0">
+  <p:cSld>
+    <p:spTree>
+      <p:nvGrpSpPr>
+        <p:cNvPr id="1" name="Shape 388"/>
+        <p:cNvGrpSpPr/>
+        <p:nvPr/>
+      </p:nvGrpSpPr>
+      <p:grpSpPr>
+        <a:xfrm>
+          <a:off x="0" y="0"/>
+          <a:ext cx="0" cy="0"/>
+          <a:chOff x="0" y="0"/>
+          <a:chExt cx="0" cy="0"/>
+        </a:xfrm>
+      </p:grpSpPr>
+      <p:sp>
+        <p:nvSpPr>
+          <p:cNvPr id="389" name="Google Shape;389;g11771f64633_0_44:notes"/>
+          <p:cNvSpPr>
+            <a:spLocks noGrp="1" noRot="1" noChangeAspect="1"/>
+          </p:cNvSpPr>
+          <p:nvPr>
+            <p:ph type="sldImg" idx="2"/>
+          </p:nvPr>
+        </p:nvSpPr>
+        <p:spPr>
+          <a:xfrm>
+            <a:off x="381300" y="685800"/>
+            <a:ext cx="6096000" cy="3429000"/>
+          </a:xfrm>
+          <a:custGeom>
+            <a:avLst/>
+            <a:gdLst/>
+            <a:ahLst/>
+            <a:cxnLst/>
+            <a:rect l="l" t="t" r="r" b="b"/>
+            <a:pathLst>
+              <a:path w="120000" h="120000" extrusionOk="0">
+                <a:moveTo>
+                  <a:pt x="0" y="0"/>
+                </a:moveTo>
+                <a:lnTo>
+                  <a:pt x="120000" y="0"/>
+                </a:lnTo>
+                <a:lnTo>
+                  <a:pt x="120000" y="120000"/>
+                </a:lnTo>
+                <a:lnTo>
+                  <a:pt x="0" y="120000"/>
+                </a:lnTo>
+                <a:close/>
+              </a:path>
+            </a:pathLst>
+          </a:custGeom>
+        </p:spPr>
+      </p:sp>
+      <p:sp>
+        <p:nvSpPr>
+          <p:cNvPr id="390" name="Google Shape;390;g11771f64633_0_44:notes"/>
           <p:cNvSpPr txBox="1">
             <a:spLocks noGrp="1"/>
           </p:cNvSpPr>
@@ -1246,6 +1984,318 @@
 </p:notes>
 </file>
 
+<file path=ppt/notesSlides/notesSlide20.xml><?xml version="1.0" encoding="utf-8"?>
+<p:notes xmlns:a="http://schemas.openxmlformats.org/drawingml/2006/main" xmlns:r="http://schemas.openxmlformats.org/officeDocument/2006/relationships" xmlns:p="http://schemas.openxmlformats.org/presentationml/2006/main" showMasterSp="0" showMasterPhAnim="0">
+  <p:cSld>
+    <p:spTree>
+      <p:nvGrpSpPr>
+        <p:cNvPr id="1" name="Shape 394"/>
+        <p:cNvGrpSpPr/>
+        <p:nvPr/>
+      </p:nvGrpSpPr>
+      <p:grpSpPr>
+        <a:xfrm>
+          <a:off x="0" y="0"/>
+          <a:ext cx="0" cy="0"/>
+          <a:chOff x="0" y="0"/>
+          <a:chExt cx="0" cy="0"/>
+        </a:xfrm>
+      </p:grpSpPr>
+      <p:sp>
+        <p:nvSpPr>
+          <p:cNvPr id="395" name="Google Shape;395;g11771f64633_0_50:notes"/>
+          <p:cNvSpPr>
+            <a:spLocks noGrp="1" noRot="1" noChangeAspect="1"/>
+          </p:cNvSpPr>
+          <p:nvPr>
+            <p:ph type="sldImg" idx="2"/>
+          </p:nvPr>
+        </p:nvSpPr>
+        <p:spPr>
+          <a:xfrm>
+            <a:off x="381300" y="685800"/>
+            <a:ext cx="6096000" cy="3429000"/>
+          </a:xfrm>
+          <a:custGeom>
+            <a:avLst/>
+            <a:gdLst/>
+            <a:ahLst/>
+            <a:cxnLst/>
+            <a:rect l="l" t="t" r="r" b="b"/>
+            <a:pathLst>
+              <a:path w="120000" h="120000" extrusionOk="0">
+                <a:moveTo>
+                  <a:pt x="0" y="0"/>
+                </a:moveTo>
+                <a:lnTo>
+                  <a:pt x="120000" y="0"/>
+                </a:lnTo>
+                <a:lnTo>
+                  <a:pt x="120000" y="120000"/>
+                </a:lnTo>
+                <a:lnTo>
+                  <a:pt x="0" y="120000"/>
+                </a:lnTo>
+                <a:close/>
+              </a:path>
+            </a:pathLst>
+          </a:custGeom>
+        </p:spPr>
+      </p:sp>
+      <p:sp>
+        <p:nvSpPr>
+          <p:cNvPr id="396" name="Google Shape;396;g11771f64633_0_50:notes"/>
+          <p:cNvSpPr txBox="1">
+            <a:spLocks noGrp="1"/>
+          </p:cNvSpPr>
+          <p:nvPr>
+            <p:ph type="body" idx="1"/>
+          </p:nvPr>
+        </p:nvSpPr>
+        <p:spPr>
+          <a:xfrm>
+            <a:off x="685800" y="4343400"/>
+            <a:ext cx="5486400" cy="4114800"/>
+          </a:xfrm>
+          <a:prstGeom prst="rect">
+            <a:avLst/>
+          </a:prstGeom>
+        </p:spPr>
+        <p:txBody>
+          <a:bodyPr spcFirstLastPara="1" wrap="square" lIns="91425" tIns="91425" rIns="91425" bIns="91425" anchor="t" anchorCtr="0">
+            <a:noAutofit/>
+          </a:bodyPr>
+          <a:lstStyle/>
+          <a:p>
+            <a:pPr marL="0" lvl="0" indent="0" algn="l" rtl="0">
+              <a:spcBef>
+                <a:spcPts val="0"/>
+              </a:spcBef>
+              <a:spcAft>
+                <a:spcPts val="0"/>
+              </a:spcAft>
+              <a:buNone/>
+            </a:pPr>
+            <a:endParaRPr/>
+          </a:p>
+        </p:txBody>
+      </p:sp>
+    </p:spTree>
+  </p:cSld>
+  <p:clrMapOvr>
+    <a:masterClrMapping/>
+  </p:clrMapOvr>
+</p:notes>
+</file>
+
+<file path=ppt/notesSlides/notesSlide21.xml><?xml version="1.0" encoding="utf-8"?>
+<p:notes xmlns:a="http://schemas.openxmlformats.org/drawingml/2006/main" xmlns:r="http://schemas.openxmlformats.org/officeDocument/2006/relationships" xmlns:p="http://schemas.openxmlformats.org/presentationml/2006/main" showMasterSp="0" showMasterPhAnim="0">
+  <p:cSld>
+    <p:spTree>
+      <p:nvGrpSpPr>
+        <p:cNvPr id="1" name="Shape 400"/>
+        <p:cNvGrpSpPr/>
+        <p:nvPr/>
+      </p:nvGrpSpPr>
+      <p:grpSpPr>
+        <a:xfrm>
+          <a:off x="0" y="0"/>
+          <a:ext cx="0" cy="0"/>
+          <a:chOff x="0" y="0"/>
+          <a:chExt cx="0" cy="0"/>
+        </a:xfrm>
+      </p:grpSpPr>
+      <p:sp>
+        <p:nvSpPr>
+          <p:cNvPr id="401" name="Google Shape;401;g11771f64633_0_56:notes"/>
+          <p:cNvSpPr>
+            <a:spLocks noGrp="1" noRot="1" noChangeAspect="1"/>
+          </p:cNvSpPr>
+          <p:nvPr>
+            <p:ph type="sldImg" idx="2"/>
+          </p:nvPr>
+        </p:nvSpPr>
+        <p:spPr>
+          <a:xfrm>
+            <a:off x="381300" y="685800"/>
+            <a:ext cx="6096000" cy="3429000"/>
+          </a:xfrm>
+          <a:custGeom>
+            <a:avLst/>
+            <a:gdLst/>
+            <a:ahLst/>
+            <a:cxnLst/>
+            <a:rect l="l" t="t" r="r" b="b"/>
+            <a:pathLst>
+              <a:path w="120000" h="120000" extrusionOk="0">
+                <a:moveTo>
+                  <a:pt x="0" y="0"/>
+                </a:moveTo>
+                <a:lnTo>
+                  <a:pt x="120000" y="0"/>
+                </a:lnTo>
+                <a:lnTo>
+                  <a:pt x="120000" y="120000"/>
+                </a:lnTo>
+                <a:lnTo>
+                  <a:pt x="0" y="120000"/>
+                </a:lnTo>
+                <a:close/>
+              </a:path>
+            </a:pathLst>
+          </a:custGeom>
+        </p:spPr>
+      </p:sp>
+      <p:sp>
+        <p:nvSpPr>
+          <p:cNvPr id="402" name="Google Shape;402;g11771f64633_0_56:notes"/>
+          <p:cNvSpPr txBox="1">
+            <a:spLocks noGrp="1"/>
+          </p:cNvSpPr>
+          <p:nvPr>
+            <p:ph type="body" idx="1"/>
+          </p:nvPr>
+        </p:nvSpPr>
+        <p:spPr>
+          <a:xfrm>
+            <a:off x="685800" y="4343400"/>
+            <a:ext cx="5486400" cy="4114800"/>
+          </a:xfrm>
+          <a:prstGeom prst="rect">
+            <a:avLst/>
+          </a:prstGeom>
+        </p:spPr>
+        <p:txBody>
+          <a:bodyPr spcFirstLastPara="1" wrap="square" lIns="91425" tIns="91425" rIns="91425" bIns="91425" anchor="t" anchorCtr="0">
+            <a:noAutofit/>
+          </a:bodyPr>
+          <a:lstStyle/>
+          <a:p>
+            <a:pPr marL="0" lvl="0" indent="0" algn="l" rtl="0">
+              <a:spcBef>
+                <a:spcPts val="0"/>
+              </a:spcBef>
+              <a:spcAft>
+                <a:spcPts val="0"/>
+              </a:spcAft>
+              <a:buNone/>
+            </a:pPr>
+            <a:endParaRPr/>
+          </a:p>
+        </p:txBody>
+      </p:sp>
+    </p:spTree>
+  </p:cSld>
+  <p:clrMapOvr>
+    <a:masterClrMapping/>
+  </p:clrMapOvr>
+</p:notes>
+</file>
+
+<file path=ppt/notesSlides/notesSlide22.xml><?xml version="1.0" encoding="utf-8"?>
+<p:notes xmlns:a="http://schemas.openxmlformats.org/drawingml/2006/main" xmlns:r="http://schemas.openxmlformats.org/officeDocument/2006/relationships" xmlns:p="http://schemas.openxmlformats.org/presentationml/2006/main" showMasterSp="0" showMasterPhAnim="0">
+  <p:cSld>
+    <p:spTree>
+      <p:nvGrpSpPr>
+        <p:cNvPr id="1" name="Shape 406"/>
+        <p:cNvGrpSpPr/>
+        <p:nvPr/>
+      </p:nvGrpSpPr>
+      <p:grpSpPr>
+        <a:xfrm>
+          <a:off x="0" y="0"/>
+          <a:ext cx="0" cy="0"/>
+          <a:chOff x="0" y="0"/>
+          <a:chExt cx="0" cy="0"/>
+        </a:xfrm>
+      </p:grpSpPr>
+      <p:sp>
+        <p:nvSpPr>
+          <p:cNvPr id="407" name="Google Shape;407;g11771f64633_0_62:notes"/>
+          <p:cNvSpPr>
+            <a:spLocks noGrp="1" noRot="1" noChangeAspect="1"/>
+          </p:cNvSpPr>
+          <p:nvPr>
+            <p:ph type="sldImg" idx="2"/>
+          </p:nvPr>
+        </p:nvSpPr>
+        <p:spPr>
+          <a:xfrm>
+            <a:off x="381300" y="685800"/>
+            <a:ext cx="6096000" cy="3429000"/>
+          </a:xfrm>
+          <a:custGeom>
+            <a:avLst/>
+            <a:gdLst/>
+            <a:ahLst/>
+            <a:cxnLst/>
+            <a:rect l="l" t="t" r="r" b="b"/>
+            <a:pathLst>
+              <a:path w="120000" h="120000" extrusionOk="0">
+                <a:moveTo>
+                  <a:pt x="0" y="0"/>
+                </a:moveTo>
+                <a:lnTo>
+                  <a:pt x="120000" y="0"/>
+                </a:lnTo>
+                <a:lnTo>
+                  <a:pt x="120000" y="120000"/>
+                </a:lnTo>
+                <a:lnTo>
+                  <a:pt x="0" y="120000"/>
+                </a:lnTo>
+                <a:close/>
+              </a:path>
+            </a:pathLst>
+          </a:custGeom>
+        </p:spPr>
+      </p:sp>
+      <p:sp>
+        <p:nvSpPr>
+          <p:cNvPr id="408" name="Google Shape;408;g11771f64633_0_62:notes"/>
+          <p:cNvSpPr txBox="1">
+            <a:spLocks noGrp="1"/>
+          </p:cNvSpPr>
+          <p:nvPr>
+            <p:ph type="body" idx="1"/>
+          </p:nvPr>
+        </p:nvSpPr>
+        <p:spPr>
+          <a:xfrm>
+            <a:off x="685800" y="4343400"/>
+            <a:ext cx="5486400" cy="4114800"/>
+          </a:xfrm>
+          <a:prstGeom prst="rect">
+            <a:avLst/>
+          </a:prstGeom>
+        </p:spPr>
+        <p:txBody>
+          <a:bodyPr spcFirstLastPara="1" wrap="square" lIns="91425" tIns="91425" rIns="91425" bIns="91425" anchor="t" anchorCtr="0">
+            <a:noAutofit/>
+          </a:bodyPr>
+          <a:lstStyle/>
+          <a:p>
+            <a:pPr marL="0" lvl="0" indent="0" algn="l" rtl="0">
+              <a:spcBef>
+                <a:spcPts val="0"/>
+              </a:spcBef>
+              <a:spcAft>
+                <a:spcPts val="0"/>
+              </a:spcAft>
+              <a:buNone/>
+            </a:pPr>
+            <a:endParaRPr/>
+          </a:p>
+        </p:txBody>
+      </p:sp>
+    </p:spTree>
+  </p:cSld>
+  <p:clrMapOvr>
+    <a:masterClrMapping/>
+  </p:clrMapOvr>
+</p:notes>
+</file>
+
 <file path=ppt/notesSlides/notesSlide3.xml><?xml version="1.0" encoding="utf-8"?>
 <p:notes xmlns:a="http://schemas.openxmlformats.org/drawingml/2006/main" xmlns:r="http://schemas.openxmlformats.org/officeDocument/2006/relationships" xmlns:p="http://schemas.openxmlformats.org/presentationml/2006/main" showMasterSp="0" showMasterPhAnim="0">
   <p:cSld>
@@ -1785,7 +2835,7 @@
       </p:grpSpPr>
       <p:sp>
         <p:nvSpPr>
-          <p:cNvPr id="321" name="Google Shape;321;g1156f46ef80_0_305:notes"/>
+          <p:cNvPr id="321" name="Google Shape;321;g11771f64633_0_0:notes"/>
           <p:cNvSpPr>
             <a:spLocks noGrp="1" noRot="1" noChangeAspect="1"/>
           </p:cNvSpPr>
@@ -1826,7 +2876,7 @@
       </p:sp>
       <p:sp>
         <p:nvSpPr>
-          <p:cNvPr id="322" name="Google Shape;322;g1156f46ef80_0_305:notes"/>
+          <p:cNvPr id="322" name="Google Shape;322;g11771f64633_0_0:notes"/>
           <p:cNvSpPr txBox="1">
             <a:spLocks noGrp="1"/>
           </p:cNvSpPr>
@@ -1889,7 +2939,7 @@
       </p:grpSpPr>
       <p:sp>
         <p:nvSpPr>
-          <p:cNvPr id="327" name="Google Shape;327;g1156f46ef80_0_310:notes"/>
+          <p:cNvPr id="327" name="Google Shape;327;g11771f64633_0_7:notes"/>
           <p:cNvSpPr>
             <a:spLocks noGrp="1" noRot="1" noChangeAspect="1"/>
           </p:cNvSpPr>
@@ -1930,7 +2980,7 @@
       </p:sp>
       <p:sp>
         <p:nvSpPr>
-          <p:cNvPr id="328" name="Google Shape;328;g1156f46ef80_0_310:notes"/>
+          <p:cNvPr id="328" name="Google Shape;328;g11771f64633_0_7:notes"/>
           <p:cNvSpPr txBox="1">
             <a:spLocks noGrp="1"/>
           </p:cNvSpPr>
@@ -15969,7 +17019,7 @@
   <p:cSld>
     <p:spTree>
       <p:nvGrpSpPr>
-        <p:cNvPr id="1" name="Shape 335"/>
+        <p:cNvPr id="1" name="Shape 338"/>
         <p:cNvGrpSpPr/>
         <p:nvPr/>
       </p:nvGrpSpPr>
@@ -15983,7 +17033,7 @@
       </p:grpSpPr>
       <p:sp>
         <p:nvSpPr>
-          <p:cNvPr id="336" name="Google Shape;336;p22"/>
+          <p:cNvPr id="339" name="Google Shape;339;p22"/>
           <p:cNvSpPr txBox="1">
             <a:spLocks noGrp="1"/>
           </p:cNvSpPr>
@@ -16017,7 +17067,7 @@
             </a:pPr>
             <a:r>
               <a:rPr lang="en"/>
-              <a:t>Machine Learning Results (insert here)</a:t>
+              <a:t>Postgres (insert here)</a:t>
             </a:r>
             <a:endParaRPr/>
           </a:p>
@@ -16025,7 +17075,7 @@
       </p:sp>
       <p:sp>
         <p:nvSpPr>
-          <p:cNvPr id="337" name="Google Shape;337;p22"/>
+          <p:cNvPr id="340" name="Google Shape;340;p22"/>
           <p:cNvSpPr txBox="1">
             <a:spLocks noGrp="1"/>
           </p:cNvSpPr>
@@ -16074,7 +17124,7 @@
   <p:cSld>
     <p:spTree>
       <p:nvGrpSpPr>
-        <p:cNvPr id="1" name="Shape 341"/>
+        <p:cNvPr id="1" name="Shape 344"/>
         <p:cNvGrpSpPr/>
         <p:nvPr/>
       </p:nvGrpSpPr>
@@ -16088,7 +17138,7 @@
       </p:grpSpPr>
       <p:sp>
         <p:nvSpPr>
-          <p:cNvPr id="342" name="Google Shape;342;p23"/>
+          <p:cNvPr id="345" name="Google Shape;345;p23"/>
           <p:cNvSpPr txBox="1">
             <a:spLocks noGrp="1"/>
           </p:cNvSpPr>
@@ -16122,7 +17172,7 @@
             </a:pPr>
             <a:r>
               <a:rPr lang="en"/>
-              <a:t>Visualization (insert here)</a:t>
+              <a:t>Machine Learning (insert here)</a:t>
             </a:r>
             <a:endParaRPr/>
           </a:p>
@@ -16130,7 +17180,7 @@
       </p:sp>
       <p:sp>
         <p:nvSpPr>
-          <p:cNvPr id="343" name="Google Shape;343;p23"/>
+          <p:cNvPr id="346" name="Google Shape;346;p23"/>
           <p:cNvSpPr txBox="1">
             <a:spLocks noGrp="1"/>
           </p:cNvSpPr>
@@ -16166,34 +17216,6 @@
           </a:p>
         </p:txBody>
       </p:sp>
-      <p:pic>
-        <p:nvPicPr>
-          <p:cNvPr id="344" name="Google Shape;344;p23"/>
-          <p:cNvPicPr preferRelativeResize="0"/>
-          <p:nvPr/>
-        </p:nvPicPr>
-        <p:blipFill>
-          <a:blip r:embed="rId3">
-            <a:alphaModFix/>
-          </a:blip>
-          <a:stretch>
-            <a:fillRect/>
-          </a:stretch>
-        </p:blipFill>
-        <p:spPr>
-          <a:xfrm>
-            <a:off x="1303800" y="1400050"/>
-            <a:ext cx="7030499" cy="3635625"/>
-          </a:xfrm>
-          <a:prstGeom prst="rect">
-            <a:avLst/>
-          </a:prstGeom>
-          <a:noFill/>
-          <a:ln>
-            <a:noFill/>
-          </a:ln>
-        </p:spPr>
-      </p:pic>
     </p:spTree>
   </p:cSld>
   <p:clrMapOvr>
@@ -16207,7 +17229,7 @@
   <p:cSld>
     <p:spTree>
       <p:nvGrpSpPr>
-        <p:cNvPr id="1" name="Shape 348"/>
+        <p:cNvPr id="1" name="Shape 350"/>
         <p:cNvGrpSpPr/>
         <p:nvPr/>
       </p:nvGrpSpPr>
@@ -16221,7 +17243,7 @@
       </p:grpSpPr>
       <p:sp>
         <p:nvSpPr>
-          <p:cNvPr id="349" name="Google Shape;349;p24"/>
+          <p:cNvPr id="351" name="Google Shape;351;p24"/>
           <p:cNvSpPr txBox="1">
             <a:spLocks noGrp="1"/>
           </p:cNvSpPr>
@@ -16255,7 +17277,7 @@
             </a:pPr>
             <a:r>
               <a:rPr lang="en"/>
-              <a:t>Visualization (cont.)</a:t>
+              <a:t>Machine Learning Results (insert here)</a:t>
             </a:r>
             <a:endParaRPr/>
           </a:p>
@@ -16263,7 +17285,7 @@
       </p:sp>
       <p:sp>
         <p:nvSpPr>
-          <p:cNvPr id="350" name="Google Shape;350;p24"/>
+          <p:cNvPr id="352" name="Google Shape;352;p24"/>
           <p:cNvSpPr txBox="1">
             <a:spLocks noGrp="1"/>
           </p:cNvSpPr>
@@ -16299,9 +17321,222 @@
           </a:p>
         </p:txBody>
       </p:sp>
+    </p:spTree>
+  </p:cSld>
+  <p:clrMapOvr>
+    <a:masterClrMapping/>
+  </p:clrMapOvr>
+</p:sld>
+</file>
+
+<file path=ppt/slides/slide13.xml><?xml version="1.0" encoding="utf-8"?>
+<p:sld xmlns:a="http://schemas.openxmlformats.org/drawingml/2006/main" xmlns:r="http://schemas.openxmlformats.org/officeDocument/2006/relationships" xmlns:p="http://schemas.openxmlformats.org/presentationml/2006/main">
+  <p:cSld>
+    <p:spTree>
+      <p:nvGrpSpPr>
+        <p:cNvPr id="1" name="Shape 356"/>
+        <p:cNvGrpSpPr/>
+        <p:nvPr/>
+      </p:nvGrpSpPr>
+      <p:grpSpPr>
+        <a:xfrm>
+          <a:off x="0" y="0"/>
+          <a:ext cx="0" cy="0"/>
+          <a:chOff x="0" y="0"/>
+          <a:chExt cx="0" cy="0"/>
+        </a:xfrm>
+      </p:grpSpPr>
+      <p:sp>
+        <p:nvSpPr>
+          <p:cNvPr id="357" name="Google Shape;357;p25"/>
+          <p:cNvSpPr txBox="1">
+            <a:spLocks noGrp="1"/>
+          </p:cNvSpPr>
+          <p:nvPr>
+            <p:ph type="title"/>
+          </p:nvPr>
+        </p:nvSpPr>
+        <p:spPr>
+          <a:xfrm>
+            <a:off x="1303800" y="598575"/>
+            <a:ext cx="7030500" cy="999300"/>
+          </a:xfrm>
+          <a:prstGeom prst="rect">
+            <a:avLst/>
+          </a:prstGeom>
+        </p:spPr>
+        <p:txBody>
+          <a:bodyPr spcFirstLastPara="1" wrap="square" lIns="91425" tIns="91425" rIns="91425" bIns="91425" anchor="t" anchorCtr="0">
+            <a:normAutofit/>
+          </a:bodyPr>
+          <a:lstStyle/>
+          <a:p>
+            <a:pPr marL="0" lvl="0" indent="0" algn="l" rtl="0">
+              <a:spcBef>
+                <a:spcPts val="0"/>
+              </a:spcBef>
+              <a:spcAft>
+                <a:spcPts val="0"/>
+              </a:spcAft>
+              <a:buNone/>
+            </a:pPr>
+            <a:r>
+              <a:rPr lang="en"/>
+              <a:t>Visualization</a:t>
+            </a:r>
+            <a:endParaRPr/>
+          </a:p>
+        </p:txBody>
+      </p:sp>
+      <p:sp>
+        <p:nvSpPr>
+          <p:cNvPr id="358" name="Google Shape;358;p25"/>
+          <p:cNvSpPr txBox="1">
+            <a:spLocks noGrp="1"/>
+          </p:cNvSpPr>
+          <p:nvPr>
+            <p:ph type="body" idx="1"/>
+          </p:nvPr>
+        </p:nvSpPr>
+        <p:spPr>
+          <a:xfrm>
+            <a:off x="1303800" y="1990050"/>
+            <a:ext cx="7030500" cy="2541600"/>
+          </a:xfrm>
+          <a:prstGeom prst="rect">
+            <a:avLst/>
+          </a:prstGeom>
+        </p:spPr>
+        <p:txBody>
+          <a:bodyPr spcFirstLastPara="1" wrap="square" lIns="91425" tIns="91425" rIns="91425" bIns="91425" anchor="t" anchorCtr="0">
+            <a:normAutofit/>
+          </a:bodyPr>
+          <a:lstStyle/>
+          <a:p>
+            <a:pPr marL="0" lvl="0" indent="0" algn="l" rtl="0">
+              <a:spcBef>
+                <a:spcPts val="0"/>
+              </a:spcBef>
+              <a:spcAft>
+                <a:spcPts val="0"/>
+              </a:spcAft>
+              <a:buNone/>
+            </a:pPr>
+            <a:r>
+              <a:rPr lang="en"/>
+              <a:t>The following slides are snippets from the Tableau story created from our data sets. The slides include potential other data sets for review outside of populations addressed in the project i.e., Race, Employment, Gender, and Education Data for Veterans.</a:t>
+            </a:r>
+            <a:endParaRPr/>
+          </a:p>
+          <a:p>
+            <a:pPr marL="0" lvl="0" indent="0" algn="l" rtl="0">
+              <a:spcBef>
+                <a:spcPts val="1200"/>
+              </a:spcBef>
+              <a:spcAft>
+                <a:spcPts val="0"/>
+              </a:spcAft>
+              <a:buNone/>
+            </a:pPr>
+            <a:r>
+              <a:rPr lang="en"/>
+              <a:t>Tableau story can be found here: </a:t>
+            </a:r>
+            <a:r>
+              <a:rPr lang="en" u="sng">
+                <a:solidFill>
+                  <a:schemeClr val="hlink"/>
+                </a:solidFill>
+                <a:hlinkClick r:id="rId3"/>
+              </a:rPr>
+              <a:t>https://public.tableau.com/views/FinalProject_16450225195590/VeteranData?:language=en-US&amp;publish=yes&amp;:display_count=n&amp;:origin=viz_share_link</a:t>
+            </a:r>
+            <a:endParaRPr/>
+          </a:p>
+          <a:p>
+            <a:pPr marL="0" lvl="0" indent="0" algn="l" rtl="0">
+              <a:spcBef>
+                <a:spcPts val="1200"/>
+              </a:spcBef>
+              <a:spcAft>
+                <a:spcPts val="1200"/>
+              </a:spcAft>
+              <a:buNone/>
+            </a:pPr>
+            <a:endParaRPr/>
+          </a:p>
+        </p:txBody>
+      </p:sp>
+    </p:spTree>
+  </p:cSld>
+  <p:clrMapOvr>
+    <a:masterClrMapping/>
+  </p:clrMapOvr>
+</p:sld>
+</file>
+
+<file path=ppt/slides/slide14.xml><?xml version="1.0" encoding="utf-8"?>
+<p:sld xmlns:a="http://schemas.openxmlformats.org/drawingml/2006/main" xmlns:r="http://schemas.openxmlformats.org/officeDocument/2006/relationships" xmlns:p="http://schemas.openxmlformats.org/presentationml/2006/main">
+  <p:cSld>
+    <p:spTree>
+      <p:nvGrpSpPr>
+        <p:cNvPr id="1" name="Shape 362"/>
+        <p:cNvGrpSpPr/>
+        <p:nvPr/>
+      </p:nvGrpSpPr>
+      <p:grpSpPr>
+        <a:xfrm>
+          <a:off x="0" y="0"/>
+          <a:ext cx="0" cy="0"/>
+          <a:chOff x="0" y="0"/>
+          <a:chExt cx="0" cy="0"/>
+        </a:xfrm>
+      </p:grpSpPr>
+      <p:sp>
+        <p:nvSpPr>
+          <p:cNvPr id="363" name="Google Shape;363;p26"/>
+          <p:cNvSpPr txBox="1">
+            <a:spLocks noGrp="1"/>
+          </p:cNvSpPr>
+          <p:nvPr>
+            <p:ph type="title"/>
+          </p:nvPr>
+        </p:nvSpPr>
+        <p:spPr>
+          <a:xfrm>
+            <a:off x="1303800" y="598575"/>
+            <a:ext cx="7030500" cy="999300"/>
+          </a:xfrm>
+          <a:prstGeom prst="rect">
+            <a:avLst/>
+          </a:prstGeom>
+        </p:spPr>
+        <p:txBody>
+          <a:bodyPr spcFirstLastPara="1" wrap="square" lIns="91425" tIns="91425" rIns="91425" bIns="91425" anchor="t" anchorCtr="0">
+            <a:normAutofit fontScale="90000"/>
+          </a:bodyPr>
+          <a:lstStyle/>
+          <a:p>
+            <a:pPr marL="0" lvl="0" indent="0" algn="l" rtl="0">
+              <a:spcBef>
+                <a:spcPts val="0"/>
+              </a:spcBef>
+              <a:spcAft>
+                <a:spcPts val="0"/>
+              </a:spcAft>
+              <a:buNone/>
+            </a:pPr>
+            <a:r>
+              <a:rPr lang="en"/>
+              <a:t>Visualization (Total Population Per State)</a:t>
+            </a:r>
+            <a:endParaRPr/>
+          </a:p>
+        </p:txBody>
+      </p:sp>
       <p:pic>
         <p:nvPicPr>
-          <p:cNvPr id="351" name="Google Shape;351;p24"/>
+          <p:cNvPr id="364" name="Google Shape;364;p26"/>
           <p:cNvPicPr preferRelativeResize="0"/>
           <p:nvPr/>
         </p:nvPicPr>
@@ -16315,8 +17550,476 @@
         </p:blipFill>
         <p:spPr>
           <a:xfrm>
-            <a:off x="1303800" y="1229125"/>
-            <a:ext cx="7030501" cy="3807775"/>
+            <a:off x="1303800" y="1377600"/>
+            <a:ext cx="6624826" cy="3473900"/>
+          </a:xfrm>
+          <a:prstGeom prst="rect">
+            <a:avLst/>
+          </a:prstGeom>
+          <a:noFill/>
+          <a:ln>
+            <a:noFill/>
+          </a:ln>
+        </p:spPr>
+      </p:pic>
+    </p:spTree>
+  </p:cSld>
+  <p:clrMapOvr>
+    <a:masterClrMapping/>
+  </p:clrMapOvr>
+</p:sld>
+</file>
+
+<file path=ppt/slides/slide15.xml><?xml version="1.0" encoding="utf-8"?>
+<p:sld xmlns:a="http://schemas.openxmlformats.org/drawingml/2006/main" xmlns:r="http://schemas.openxmlformats.org/officeDocument/2006/relationships" xmlns:p="http://schemas.openxmlformats.org/presentationml/2006/main">
+  <p:cSld>
+    <p:spTree>
+      <p:nvGrpSpPr>
+        <p:cNvPr id="1" name="Shape 368"/>
+        <p:cNvGrpSpPr/>
+        <p:nvPr/>
+      </p:nvGrpSpPr>
+      <p:grpSpPr>
+        <a:xfrm>
+          <a:off x="0" y="0"/>
+          <a:ext cx="0" cy="0"/>
+          <a:chOff x="0" y="0"/>
+          <a:chExt cx="0" cy="0"/>
+        </a:xfrm>
+      </p:grpSpPr>
+      <p:sp>
+        <p:nvSpPr>
+          <p:cNvPr id="369" name="Google Shape;369;p27"/>
+          <p:cNvSpPr txBox="1">
+            <a:spLocks noGrp="1"/>
+          </p:cNvSpPr>
+          <p:nvPr>
+            <p:ph type="title"/>
+          </p:nvPr>
+        </p:nvSpPr>
+        <p:spPr>
+          <a:xfrm>
+            <a:off x="1303800" y="598575"/>
+            <a:ext cx="7030500" cy="999300"/>
+          </a:xfrm>
+          <a:prstGeom prst="rect">
+            <a:avLst/>
+          </a:prstGeom>
+        </p:spPr>
+        <p:txBody>
+          <a:bodyPr spcFirstLastPara="1" wrap="square" lIns="91425" tIns="91425" rIns="91425" bIns="91425" anchor="t" anchorCtr="0">
+            <a:normAutofit fontScale="90000"/>
+          </a:bodyPr>
+          <a:lstStyle/>
+          <a:p>
+            <a:pPr marL="0" lvl="0" indent="0" algn="l" rtl="0">
+              <a:spcBef>
+                <a:spcPts val="0"/>
+              </a:spcBef>
+              <a:spcAft>
+                <a:spcPts val="0"/>
+              </a:spcAft>
+              <a:buNone/>
+            </a:pPr>
+            <a:r>
+              <a:rPr lang="en"/>
+              <a:t>Visualization (Veteran Population Per State)</a:t>
+            </a:r>
+            <a:endParaRPr/>
+          </a:p>
+        </p:txBody>
+      </p:sp>
+      <p:pic>
+        <p:nvPicPr>
+          <p:cNvPr id="370" name="Google Shape;370;p27"/>
+          <p:cNvPicPr preferRelativeResize="0"/>
+          <p:nvPr/>
+        </p:nvPicPr>
+        <p:blipFill>
+          <a:blip r:embed="rId3">
+            <a:alphaModFix/>
+          </a:blip>
+          <a:stretch>
+            <a:fillRect/>
+          </a:stretch>
+        </p:blipFill>
+        <p:spPr>
+          <a:xfrm>
+            <a:off x="1303800" y="1355125"/>
+            <a:ext cx="6948312" cy="3557425"/>
+          </a:xfrm>
+          <a:prstGeom prst="rect">
+            <a:avLst/>
+          </a:prstGeom>
+          <a:noFill/>
+          <a:ln>
+            <a:noFill/>
+          </a:ln>
+        </p:spPr>
+      </p:pic>
+    </p:spTree>
+  </p:cSld>
+  <p:clrMapOvr>
+    <a:masterClrMapping/>
+  </p:clrMapOvr>
+</p:sld>
+</file>
+
+<file path=ppt/slides/slide16.xml><?xml version="1.0" encoding="utf-8"?>
+<p:sld xmlns:a="http://schemas.openxmlformats.org/drawingml/2006/main" xmlns:r="http://schemas.openxmlformats.org/officeDocument/2006/relationships" xmlns:p="http://schemas.openxmlformats.org/presentationml/2006/main">
+  <p:cSld>
+    <p:spTree>
+      <p:nvGrpSpPr>
+        <p:cNvPr id="1" name="Shape 374"/>
+        <p:cNvGrpSpPr/>
+        <p:nvPr/>
+      </p:nvGrpSpPr>
+      <p:grpSpPr>
+        <a:xfrm>
+          <a:off x="0" y="0"/>
+          <a:ext cx="0" cy="0"/>
+          <a:chOff x="0" y="0"/>
+          <a:chExt cx="0" cy="0"/>
+        </a:xfrm>
+      </p:grpSpPr>
+      <p:sp>
+        <p:nvSpPr>
+          <p:cNvPr id="375" name="Google Shape;375;p28"/>
+          <p:cNvSpPr txBox="1">
+            <a:spLocks noGrp="1"/>
+          </p:cNvSpPr>
+          <p:nvPr>
+            <p:ph type="title"/>
+          </p:nvPr>
+        </p:nvSpPr>
+        <p:spPr>
+          <a:xfrm>
+            <a:off x="1303800" y="598575"/>
+            <a:ext cx="7030500" cy="999300"/>
+          </a:xfrm>
+          <a:prstGeom prst="rect">
+            <a:avLst/>
+          </a:prstGeom>
+        </p:spPr>
+        <p:txBody>
+          <a:bodyPr spcFirstLastPara="1" wrap="square" lIns="91425" tIns="91425" rIns="91425" bIns="91425" anchor="t" anchorCtr="0">
+            <a:normAutofit/>
+          </a:bodyPr>
+          <a:lstStyle/>
+          <a:p>
+            <a:pPr marL="0" lvl="0" indent="0" algn="l" rtl="0">
+              <a:spcBef>
+                <a:spcPts val="0"/>
+              </a:spcBef>
+              <a:spcAft>
+                <a:spcPts val="0"/>
+              </a:spcAft>
+              <a:buSzPts val="990"/>
+              <a:buNone/>
+            </a:pPr>
+            <a:r>
+              <a:rPr lang="en" sz="1720"/>
+              <a:t>Visualization (Veteran Population vs Total Population Per State)</a:t>
+            </a:r>
+            <a:endParaRPr sz="1720"/>
+          </a:p>
+        </p:txBody>
+      </p:sp>
+      <p:pic>
+        <p:nvPicPr>
+          <p:cNvPr id="376" name="Google Shape;376;p28"/>
+          <p:cNvPicPr preferRelativeResize="0"/>
+          <p:nvPr/>
+        </p:nvPicPr>
+        <p:blipFill>
+          <a:blip r:embed="rId3">
+            <a:alphaModFix/>
+          </a:blip>
+          <a:stretch>
+            <a:fillRect/>
+          </a:stretch>
+        </p:blipFill>
+        <p:spPr>
+          <a:xfrm>
+            <a:off x="2616675" y="1518175"/>
+            <a:ext cx="3910649" cy="3240825"/>
+          </a:xfrm>
+          <a:prstGeom prst="rect">
+            <a:avLst/>
+          </a:prstGeom>
+          <a:noFill/>
+          <a:ln>
+            <a:noFill/>
+          </a:ln>
+        </p:spPr>
+      </p:pic>
+    </p:spTree>
+  </p:cSld>
+  <p:clrMapOvr>
+    <a:masterClrMapping/>
+  </p:clrMapOvr>
+</p:sld>
+</file>
+
+<file path=ppt/slides/slide17.xml><?xml version="1.0" encoding="utf-8"?>
+<p:sld xmlns:a="http://schemas.openxmlformats.org/drawingml/2006/main" xmlns:r="http://schemas.openxmlformats.org/officeDocument/2006/relationships" xmlns:p="http://schemas.openxmlformats.org/presentationml/2006/main">
+  <p:cSld>
+    <p:spTree>
+      <p:nvGrpSpPr>
+        <p:cNvPr id="1" name="Shape 380"/>
+        <p:cNvGrpSpPr/>
+        <p:nvPr/>
+      </p:nvGrpSpPr>
+      <p:grpSpPr>
+        <a:xfrm>
+          <a:off x="0" y="0"/>
+          <a:ext cx="0" cy="0"/>
+          <a:chOff x="0" y="0"/>
+          <a:chExt cx="0" cy="0"/>
+        </a:xfrm>
+      </p:grpSpPr>
+      <p:sp>
+        <p:nvSpPr>
+          <p:cNvPr id="381" name="Google Shape;381;p29"/>
+          <p:cNvSpPr txBox="1">
+            <a:spLocks noGrp="1"/>
+          </p:cNvSpPr>
+          <p:nvPr>
+            <p:ph type="title"/>
+          </p:nvPr>
+        </p:nvSpPr>
+        <p:spPr>
+          <a:xfrm>
+            <a:off x="1303800" y="598575"/>
+            <a:ext cx="7030500" cy="999300"/>
+          </a:xfrm>
+          <a:prstGeom prst="rect">
+            <a:avLst/>
+          </a:prstGeom>
+        </p:spPr>
+        <p:txBody>
+          <a:bodyPr spcFirstLastPara="1" wrap="square" lIns="91425" tIns="91425" rIns="91425" bIns="91425" anchor="t" anchorCtr="0">
+            <a:normAutofit/>
+          </a:bodyPr>
+          <a:lstStyle/>
+          <a:p>
+            <a:pPr marL="0" lvl="0" indent="0" algn="l" rtl="0">
+              <a:spcBef>
+                <a:spcPts val="0"/>
+              </a:spcBef>
+              <a:spcAft>
+                <a:spcPts val="0"/>
+              </a:spcAft>
+              <a:buSzPts val="990"/>
+              <a:buNone/>
+            </a:pPr>
+            <a:r>
+              <a:rPr lang="en" sz="2420"/>
+              <a:t>Visualization (Veteran Population Per County)</a:t>
+            </a:r>
+            <a:endParaRPr sz="2420"/>
+          </a:p>
+        </p:txBody>
+      </p:sp>
+      <p:pic>
+        <p:nvPicPr>
+          <p:cNvPr id="382" name="Google Shape;382;p29"/>
+          <p:cNvPicPr preferRelativeResize="0"/>
+          <p:nvPr/>
+        </p:nvPicPr>
+        <p:blipFill>
+          <a:blip r:embed="rId3">
+            <a:alphaModFix/>
+          </a:blip>
+          <a:stretch>
+            <a:fillRect/>
+          </a:stretch>
+        </p:blipFill>
+        <p:spPr>
+          <a:xfrm>
+            <a:off x="1303800" y="1377600"/>
+            <a:ext cx="7030499" cy="3170600"/>
+          </a:xfrm>
+          <a:prstGeom prst="rect">
+            <a:avLst/>
+          </a:prstGeom>
+          <a:noFill/>
+          <a:ln>
+            <a:noFill/>
+          </a:ln>
+        </p:spPr>
+      </p:pic>
+    </p:spTree>
+  </p:cSld>
+  <p:clrMapOvr>
+    <a:masterClrMapping/>
+  </p:clrMapOvr>
+</p:sld>
+</file>
+
+<file path=ppt/slides/slide18.xml><?xml version="1.0" encoding="utf-8"?>
+<p:sld xmlns:a="http://schemas.openxmlformats.org/drawingml/2006/main" xmlns:r="http://schemas.openxmlformats.org/officeDocument/2006/relationships" xmlns:p="http://schemas.openxmlformats.org/presentationml/2006/main">
+  <p:cSld>
+    <p:spTree>
+      <p:nvGrpSpPr>
+        <p:cNvPr id="1" name="Shape 386"/>
+        <p:cNvGrpSpPr/>
+        <p:nvPr/>
+      </p:nvGrpSpPr>
+      <p:grpSpPr>
+        <a:xfrm>
+          <a:off x="0" y="0"/>
+          <a:ext cx="0" cy="0"/>
+          <a:chOff x="0" y="0"/>
+          <a:chExt cx="0" cy="0"/>
+        </a:xfrm>
+      </p:grpSpPr>
+      <p:sp>
+        <p:nvSpPr>
+          <p:cNvPr id="387" name="Google Shape;387;p30"/>
+          <p:cNvSpPr txBox="1">
+            <a:spLocks noGrp="1"/>
+          </p:cNvSpPr>
+          <p:nvPr>
+            <p:ph type="title"/>
+          </p:nvPr>
+        </p:nvSpPr>
+        <p:spPr>
+          <a:xfrm>
+            <a:off x="1303800" y="598575"/>
+            <a:ext cx="7030500" cy="999300"/>
+          </a:xfrm>
+          <a:prstGeom prst="rect">
+            <a:avLst/>
+          </a:prstGeom>
+        </p:spPr>
+        <p:txBody>
+          <a:bodyPr spcFirstLastPara="1" wrap="square" lIns="91425" tIns="91425" rIns="91425" bIns="91425" anchor="t" anchorCtr="0">
+            <a:normAutofit/>
+          </a:bodyPr>
+          <a:lstStyle/>
+          <a:p>
+            <a:pPr marL="0" lvl="0" indent="0" algn="l" rtl="0">
+              <a:spcBef>
+                <a:spcPts val="0"/>
+              </a:spcBef>
+              <a:spcAft>
+                <a:spcPts val="0"/>
+              </a:spcAft>
+              <a:buSzPts val="990"/>
+              <a:buNone/>
+            </a:pPr>
+            <a:r>
+              <a:rPr lang="en" sz="2420"/>
+              <a:t>Visualization (Model Map)</a:t>
+            </a:r>
+            <a:endParaRPr sz="2420"/>
+          </a:p>
+        </p:txBody>
+      </p:sp>
+    </p:spTree>
+  </p:cSld>
+  <p:clrMapOvr>
+    <a:masterClrMapping/>
+  </p:clrMapOvr>
+</p:sld>
+</file>
+
+<file path=ppt/slides/slide19.xml><?xml version="1.0" encoding="utf-8"?>
+<p:sld xmlns:a="http://schemas.openxmlformats.org/drawingml/2006/main" xmlns:r="http://schemas.openxmlformats.org/officeDocument/2006/relationships" xmlns:p="http://schemas.openxmlformats.org/presentationml/2006/main">
+  <p:cSld>
+    <p:spTree>
+      <p:nvGrpSpPr>
+        <p:cNvPr id="1" name="Shape 391"/>
+        <p:cNvGrpSpPr/>
+        <p:nvPr/>
+      </p:nvGrpSpPr>
+      <p:grpSpPr>
+        <a:xfrm>
+          <a:off x="0" y="0"/>
+          <a:ext cx="0" cy="0"/>
+          <a:chOff x="0" y="0"/>
+          <a:chExt cx="0" cy="0"/>
+        </a:xfrm>
+      </p:grpSpPr>
+      <p:sp>
+        <p:nvSpPr>
+          <p:cNvPr id="392" name="Google Shape;392;p31"/>
+          <p:cNvSpPr txBox="1">
+            <a:spLocks noGrp="1"/>
+          </p:cNvSpPr>
+          <p:nvPr>
+            <p:ph type="title"/>
+          </p:nvPr>
+        </p:nvSpPr>
+        <p:spPr>
+          <a:xfrm>
+            <a:off x="1303800" y="598575"/>
+            <a:ext cx="7030500" cy="999300"/>
+          </a:xfrm>
+          <a:prstGeom prst="rect">
+            <a:avLst/>
+          </a:prstGeom>
+        </p:spPr>
+        <p:txBody>
+          <a:bodyPr spcFirstLastPara="1" wrap="square" lIns="91425" tIns="91425" rIns="91425" bIns="91425" anchor="t" anchorCtr="0">
+            <a:normAutofit/>
+          </a:bodyPr>
+          <a:lstStyle/>
+          <a:p>
+            <a:pPr marL="0" lvl="0" indent="0" algn="l" rtl="0">
+              <a:spcBef>
+                <a:spcPts val="0"/>
+              </a:spcBef>
+              <a:spcAft>
+                <a:spcPts val="0"/>
+              </a:spcAft>
+              <a:buSzPts val="990"/>
+              <a:buNone/>
+            </a:pPr>
+            <a:r>
+              <a:rPr lang="en" sz="2420"/>
+              <a:t>Visualization (Potential Data Sets for Model)</a:t>
+            </a:r>
+            <a:endParaRPr sz="2420"/>
+          </a:p>
+          <a:p>
+            <a:pPr marL="0" lvl="0" indent="0" algn="ctr" rtl="0">
+              <a:spcBef>
+                <a:spcPts val="0"/>
+              </a:spcBef>
+              <a:spcAft>
+                <a:spcPts val="0"/>
+              </a:spcAft>
+              <a:buSzPts val="990"/>
+              <a:buNone/>
+            </a:pPr>
+            <a:r>
+              <a:rPr lang="en" sz="1520"/>
+              <a:t>Veterans Per State by Gender</a:t>
+            </a:r>
+            <a:endParaRPr sz="1520"/>
+          </a:p>
+        </p:txBody>
+      </p:sp>
+      <p:pic>
+        <p:nvPicPr>
+          <p:cNvPr id="393" name="Google Shape;393;p31"/>
+          <p:cNvPicPr preferRelativeResize="0"/>
+          <p:nvPr/>
+        </p:nvPicPr>
+        <p:blipFill>
+          <a:blip r:embed="rId3">
+            <a:alphaModFix/>
+          </a:blip>
+          <a:stretch>
+            <a:fillRect/>
+          </a:stretch>
+        </p:blipFill>
+        <p:spPr>
+          <a:xfrm>
+            <a:off x="1617250" y="1597875"/>
+            <a:ext cx="5909503" cy="3240824"/>
           </a:xfrm>
           <a:prstGeom prst="rect">
             <a:avLst/>
@@ -16521,6 +18224,345 @@
           <a:xfrm>
             <a:off x="4631325" y="318463"/>
             <a:ext cx="4227301" cy="1559525"/>
+          </a:xfrm>
+          <a:prstGeom prst="rect">
+            <a:avLst/>
+          </a:prstGeom>
+          <a:noFill/>
+          <a:ln>
+            <a:noFill/>
+          </a:ln>
+        </p:spPr>
+      </p:pic>
+    </p:spTree>
+  </p:cSld>
+  <p:clrMapOvr>
+    <a:masterClrMapping/>
+  </p:clrMapOvr>
+</p:sld>
+</file>
+
+<file path=ppt/slides/slide20.xml><?xml version="1.0" encoding="utf-8"?>
+<p:sld xmlns:a="http://schemas.openxmlformats.org/drawingml/2006/main" xmlns:r="http://schemas.openxmlformats.org/officeDocument/2006/relationships" xmlns:p="http://schemas.openxmlformats.org/presentationml/2006/main">
+  <p:cSld>
+    <p:spTree>
+      <p:nvGrpSpPr>
+        <p:cNvPr id="1" name="Shape 397"/>
+        <p:cNvGrpSpPr/>
+        <p:nvPr/>
+      </p:nvGrpSpPr>
+      <p:grpSpPr>
+        <a:xfrm>
+          <a:off x="0" y="0"/>
+          <a:ext cx="0" cy="0"/>
+          <a:chOff x="0" y="0"/>
+          <a:chExt cx="0" cy="0"/>
+        </a:xfrm>
+      </p:grpSpPr>
+      <p:sp>
+        <p:nvSpPr>
+          <p:cNvPr id="398" name="Google Shape;398;p32"/>
+          <p:cNvSpPr txBox="1">
+            <a:spLocks noGrp="1"/>
+          </p:cNvSpPr>
+          <p:nvPr>
+            <p:ph type="title"/>
+          </p:nvPr>
+        </p:nvSpPr>
+        <p:spPr>
+          <a:xfrm>
+            <a:off x="1303800" y="598575"/>
+            <a:ext cx="7030500" cy="999300"/>
+          </a:xfrm>
+          <a:prstGeom prst="rect">
+            <a:avLst/>
+          </a:prstGeom>
+        </p:spPr>
+        <p:txBody>
+          <a:bodyPr spcFirstLastPara="1" wrap="square" lIns="91425" tIns="91425" rIns="91425" bIns="91425" anchor="t" anchorCtr="0">
+            <a:normAutofit/>
+          </a:bodyPr>
+          <a:lstStyle/>
+          <a:p>
+            <a:pPr marL="0" lvl="0" indent="0" algn="l" rtl="0">
+              <a:spcBef>
+                <a:spcPts val="0"/>
+              </a:spcBef>
+              <a:spcAft>
+                <a:spcPts val="0"/>
+              </a:spcAft>
+              <a:buSzPts val="990"/>
+              <a:buNone/>
+            </a:pPr>
+            <a:r>
+              <a:rPr lang="en" sz="2420"/>
+              <a:t>Visualization (Potential Data Sets for Model)</a:t>
+            </a:r>
+            <a:endParaRPr sz="2420"/>
+          </a:p>
+          <a:p>
+            <a:pPr marL="0" lvl="0" indent="0" algn="ctr" rtl="0">
+              <a:spcBef>
+                <a:spcPts val="0"/>
+              </a:spcBef>
+              <a:spcAft>
+                <a:spcPts val="0"/>
+              </a:spcAft>
+              <a:buSzPts val="990"/>
+              <a:buNone/>
+            </a:pPr>
+            <a:r>
+              <a:rPr lang="en" sz="1520"/>
+              <a:t>Veterans Per State by Race</a:t>
+            </a:r>
+            <a:endParaRPr sz="1520"/>
+          </a:p>
+        </p:txBody>
+      </p:sp>
+      <p:pic>
+        <p:nvPicPr>
+          <p:cNvPr id="399" name="Google Shape;399;p32"/>
+          <p:cNvPicPr preferRelativeResize="0"/>
+          <p:nvPr/>
+        </p:nvPicPr>
+        <p:blipFill>
+          <a:blip r:embed="rId3">
+            <a:alphaModFix/>
+          </a:blip>
+          <a:stretch>
+            <a:fillRect/>
+          </a:stretch>
+        </p:blipFill>
+        <p:spPr>
+          <a:xfrm>
+            <a:off x="1588188" y="1630475"/>
+            <a:ext cx="5967616" cy="3240825"/>
+          </a:xfrm>
+          <a:prstGeom prst="rect">
+            <a:avLst/>
+          </a:prstGeom>
+          <a:noFill/>
+          <a:ln>
+            <a:noFill/>
+          </a:ln>
+        </p:spPr>
+      </p:pic>
+    </p:spTree>
+  </p:cSld>
+  <p:clrMapOvr>
+    <a:masterClrMapping/>
+  </p:clrMapOvr>
+</p:sld>
+</file>
+
+<file path=ppt/slides/slide21.xml><?xml version="1.0" encoding="utf-8"?>
+<p:sld xmlns:a="http://schemas.openxmlformats.org/drawingml/2006/main" xmlns:r="http://schemas.openxmlformats.org/officeDocument/2006/relationships" xmlns:p="http://schemas.openxmlformats.org/presentationml/2006/main">
+  <p:cSld>
+    <p:spTree>
+      <p:nvGrpSpPr>
+        <p:cNvPr id="1" name="Shape 403"/>
+        <p:cNvGrpSpPr/>
+        <p:nvPr/>
+      </p:nvGrpSpPr>
+      <p:grpSpPr>
+        <a:xfrm>
+          <a:off x="0" y="0"/>
+          <a:ext cx="0" cy="0"/>
+          <a:chOff x="0" y="0"/>
+          <a:chExt cx="0" cy="0"/>
+        </a:xfrm>
+      </p:grpSpPr>
+      <p:sp>
+        <p:nvSpPr>
+          <p:cNvPr id="404" name="Google Shape;404;p33"/>
+          <p:cNvSpPr txBox="1">
+            <a:spLocks noGrp="1"/>
+          </p:cNvSpPr>
+          <p:nvPr>
+            <p:ph type="title"/>
+          </p:nvPr>
+        </p:nvSpPr>
+        <p:spPr>
+          <a:xfrm>
+            <a:off x="1303800" y="598575"/>
+            <a:ext cx="7030500" cy="999300"/>
+          </a:xfrm>
+          <a:prstGeom prst="rect">
+            <a:avLst/>
+          </a:prstGeom>
+        </p:spPr>
+        <p:txBody>
+          <a:bodyPr spcFirstLastPara="1" wrap="square" lIns="91425" tIns="91425" rIns="91425" bIns="91425" anchor="t" anchorCtr="0">
+            <a:normAutofit/>
+          </a:bodyPr>
+          <a:lstStyle/>
+          <a:p>
+            <a:pPr marL="0" lvl="0" indent="0" algn="l" rtl="0">
+              <a:spcBef>
+                <a:spcPts val="0"/>
+              </a:spcBef>
+              <a:spcAft>
+                <a:spcPts val="0"/>
+              </a:spcAft>
+              <a:buSzPts val="990"/>
+              <a:buNone/>
+            </a:pPr>
+            <a:r>
+              <a:rPr lang="en" sz="2420"/>
+              <a:t>Visualization (Potential Data Sets for Model)</a:t>
+            </a:r>
+            <a:endParaRPr sz="2420"/>
+          </a:p>
+          <a:p>
+            <a:pPr marL="0" lvl="0" indent="0" algn="ctr" rtl="0">
+              <a:spcBef>
+                <a:spcPts val="0"/>
+              </a:spcBef>
+              <a:spcAft>
+                <a:spcPts val="0"/>
+              </a:spcAft>
+              <a:buSzPts val="990"/>
+              <a:buNone/>
+            </a:pPr>
+            <a:r>
+              <a:rPr lang="en" sz="1520"/>
+              <a:t>Veterans Per State by Education</a:t>
+            </a:r>
+            <a:endParaRPr sz="1520"/>
+          </a:p>
+        </p:txBody>
+      </p:sp>
+      <p:pic>
+        <p:nvPicPr>
+          <p:cNvPr id="405" name="Google Shape;405;p33"/>
+          <p:cNvPicPr preferRelativeResize="0"/>
+          <p:nvPr/>
+        </p:nvPicPr>
+        <p:blipFill>
+          <a:blip r:embed="rId3">
+            <a:alphaModFix/>
+          </a:blip>
+          <a:stretch>
+            <a:fillRect/>
+          </a:stretch>
+        </p:blipFill>
+        <p:spPr>
+          <a:xfrm>
+            <a:off x="1516138" y="1525675"/>
+            <a:ext cx="6111730" cy="3240825"/>
+          </a:xfrm>
+          <a:prstGeom prst="rect">
+            <a:avLst/>
+          </a:prstGeom>
+          <a:noFill/>
+          <a:ln>
+            <a:noFill/>
+          </a:ln>
+        </p:spPr>
+      </p:pic>
+    </p:spTree>
+  </p:cSld>
+  <p:clrMapOvr>
+    <a:masterClrMapping/>
+  </p:clrMapOvr>
+</p:sld>
+</file>
+
+<file path=ppt/slides/slide22.xml><?xml version="1.0" encoding="utf-8"?>
+<p:sld xmlns:a="http://schemas.openxmlformats.org/drawingml/2006/main" xmlns:r="http://schemas.openxmlformats.org/officeDocument/2006/relationships" xmlns:p="http://schemas.openxmlformats.org/presentationml/2006/main">
+  <p:cSld>
+    <p:spTree>
+      <p:nvGrpSpPr>
+        <p:cNvPr id="1" name="Shape 409"/>
+        <p:cNvGrpSpPr/>
+        <p:nvPr/>
+      </p:nvGrpSpPr>
+      <p:grpSpPr>
+        <a:xfrm>
+          <a:off x="0" y="0"/>
+          <a:ext cx="0" cy="0"/>
+          <a:chOff x="0" y="0"/>
+          <a:chExt cx="0" cy="0"/>
+        </a:xfrm>
+      </p:grpSpPr>
+      <p:sp>
+        <p:nvSpPr>
+          <p:cNvPr id="410" name="Google Shape;410;p34"/>
+          <p:cNvSpPr txBox="1">
+            <a:spLocks noGrp="1"/>
+          </p:cNvSpPr>
+          <p:nvPr>
+            <p:ph type="title"/>
+          </p:nvPr>
+        </p:nvSpPr>
+        <p:spPr>
+          <a:xfrm>
+            <a:off x="1303800" y="598575"/>
+            <a:ext cx="7030500" cy="999300"/>
+          </a:xfrm>
+          <a:prstGeom prst="rect">
+            <a:avLst/>
+          </a:prstGeom>
+        </p:spPr>
+        <p:txBody>
+          <a:bodyPr spcFirstLastPara="1" wrap="square" lIns="91425" tIns="91425" rIns="91425" bIns="91425" anchor="t" anchorCtr="0">
+            <a:normAutofit/>
+          </a:bodyPr>
+          <a:lstStyle/>
+          <a:p>
+            <a:pPr marL="0" lvl="0" indent="0" algn="l" rtl="0">
+              <a:spcBef>
+                <a:spcPts val="0"/>
+              </a:spcBef>
+              <a:spcAft>
+                <a:spcPts val="0"/>
+              </a:spcAft>
+              <a:buSzPts val="990"/>
+              <a:buNone/>
+            </a:pPr>
+            <a:r>
+              <a:rPr lang="en" sz="2420"/>
+              <a:t>Visualization (Potential Data Sets for Model)</a:t>
+            </a:r>
+            <a:endParaRPr sz="2420"/>
+          </a:p>
+          <a:p>
+            <a:pPr marL="0" lvl="0" indent="0" algn="ctr" rtl="0">
+              <a:spcBef>
+                <a:spcPts val="0"/>
+              </a:spcBef>
+              <a:spcAft>
+                <a:spcPts val="0"/>
+              </a:spcAft>
+              <a:buSzPts val="990"/>
+              <a:buNone/>
+            </a:pPr>
+            <a:r>
+              <a:rPr lang="en" sz="1520"/>
+              <a:t>Veterans Per State by Employment Status</a:t>
+            </a:r>
+            <a:endParaRPr sz="1520"/>
+          </a:p>
+        </p:txBody>
+      </p:sp>
+      <p:pic>
+        <p:nvPicPr>
+          <p:cNvPr id="411" name="Google Shape;411;p34"/>
+          <p:cNvPicPr preferRelativeResize="0"/>
+          <p:nvPr/>
+        </p:nvPicPr>
+        <p:blipFill>
+          <a:blip r:embed="rId3">
+            <a:alphaModFix/>
+          </a:blip>
+          <a:stretch>
+            <a:fillRect/>
+          </a:stretch>
+        </p:blipFill>
+        <p:spPr>
+          <a:xfrm>
+            <a:off x="1527463" y="1597875"/>
+            <a:ext cx="6089067" cy="3240826"/>
           </a:xfrm>
           <a:prstGeom prst="rect">
             <a:avLst/>
@@ -17237,7 +19279,7 @@
             </a:pPr>
             <a:r>
               <a:rPr lang="en"/>
-              <a:t>Postgres (insert here)</a:t>
+              <a:t>Code Challenges</a:t>
             </a:r>
             <a:endParaRPr/>
           </a:p>
@@ -17256,7 +19298,7 @@
         <p:spPr>
           <a:xfrm>
             <a:off x="1303800" y="1990050"/>
-            <a:ext cx="7030500" cy="2541600"/>
+            <a:ext cx="7030500" cy="1746000"/>
           </a:xfrm>
           <a:prstGeom prst="rect">
             <a:avLst/>
@@ -17264,7 +19306,7 @@
         </p:spPr>
         <p:txBody>
           <a:bodyPr spcFirstLastPara="1" wrap="square" lIns="91425" tIns="91425" rIns="91425" bIns="91425" anchor="t" anchorCtr="0">
-            <a:normAutofit/>
+            <a:noAutofit/>
           </a:bodyPr>
           <a:lstStyle/>
           <a:p>
@@ -17273,11 +19315,84 @@
                 <a:spcPts val="0"/>
               </a:spcBef>
               <a:spcAft>
+                <a:spcPts val="0"/>
+              </a:spcAft>
+              <a:buSzPts val="605"/>
+              <a:buNone/>
+            </a:pPr>
+            <a:r>
+              <a:rPr lang="en" sz="914"/>
+              <a:t>When reviewing the DataFrame outputs, it was noticed that there were 3 major concerns.</a:t>
+            </a:r>
+            <a:endParaRPr sz="914"/>
+          </a:p>
+          <a:p>
+            <a:pPr marL="457200" lvl="0" indent="-286702" algn="l" rtl="0">
+              <a:spcBef>
                 <a:spcPts val="1200"/>
-              </a:spcAft>
-              <a:buNone/>
+              </a:spcBef>
+              <a:spcAft>
+                <a:spcPts val="0"/>
+              </a:spcAft>
+              <a:buSzPts val="915"/>
+              <a:buAutoNum type="arabicPeriod"/>
             </a:pPr>
-            <a:endParaRPr/>
+            <a:r>
+              <a:rPr lang="en" sz="914"/>
+              <a:t>Needed to change the populations in both data sets to be integers (whole numbers) instead of floating with decimals</a:t>
+            </a:r>
+            <a:endParaRPr sz="914"/>
+          </a:p>
+          <a:p>
+            <a:pPr marL="457200" lvl="0" indent="-286702" algn="l" rtl="0">
+              <a:spcBef>
+                <a:spcPts val="0"/>
+              </a:spcBef>
+              <a:spcAft>
+                <a:spcPts val="0"/>
+              </a:spcAft>
+              <a:buSzPts val="915"/>
+              <a:buAutoNum type="arabicPeriod"/>
+            </a:pPr>
+            <a:r>
+              <a:rPr lang="en" sz="914"/>
+              <a:t>In the veteran dataset, every column except the total population was listed as percentages. Had to refactor the DataFrame to provide a whole number output instead of the percentages.</a:t>
+            </a:r>
+            <a:endParaRPr sz="914"/>
+          </a:p>
+          <a:p>
+            <a:pPr marL="457200" lvl="0" indent="-286702" algn="l" rtl="0">
+              <a:spcBef>
+                <a:spcPts val="0"/>
+              </a:spcBef>
+              <a:spcAft>
+                <a:spcPts val="0"/>
+              </a:spcAft>
+              <a:buSzPts val="915"/>
+              <a:buAutoNum type="arabicPeriod"/>
+            </a:pPr>
+            <a:r>
+              <a:rPr lang="en" sz="914"/>
+              <a:t>Review of both data sets showed there were rows for each state that mentioned the state name as county. This was a concern since that row showed the total for the state and needed to be removed to ensure those outliers would not be present when working with the machine learning model</a:t>
+            </a:r>
+            <a:endParaRPr sz="914"/>
+          </a:p>
+          <a:p>
+            <a:pPr marL="0" lvl="0" indent="0" algn="l" rtl="0">
+              <a:spcBef>
+                <a:spcPts val="1200"/>
+              </a:spcBef>
+              <a:spcAft>
+                <a:spcPts val="1200"/>
+              </a:spcAft>
+              <a:buSzPts val="605"/>
+              <a:buNone/>
+            </a:pPr>
+            <a:r>
+              <a:rPr lang="en" sz="914"/>
+              <a:t>The following slide shows the final refactored DataFrames.</a:t>
+            </a:r>
+            <a:endParaRPr sz="914"/>
           </a:p>
         </p:txBody>
       </p:sp>
@@ -17342,7 +19457,7 @@
             </a:pPr>
             <a:r>
               <a:rPr lang="en"/>
-              <a:t>Machine Learning (insert here)</a:t>
+              <a:t>Code Example</a:t>
             </a:r>
             <a:endParaRPr/>
           </a:p>
@@ -17360,8 +19475,8 @@
         </p:nvSpPr>
         <p:spPr>
           <a:xfrm>
-            <a:off x="1303800" y="1990050"/>
-            <a:ext cx="7030500" cy="2541600"/>
+            <a:off x="1303800" y="1128975"/>
+            <a:ext cx="7030500" cy="468900"/>
           </a:xfrm>
           <a:prstGeom prst="rect">
             <a:avLst/>
@@ -17382,10 +19497,123 @@
               </a:spcAft>
               <a:buNone/>
             </a:pPr>
-            <a:endParaRPr/>
+            <a:r>
+              <a:rPr lang="en" sz="1000"/>
+              <a:t>Final state people data output removing the state/county concern and having whole number data</a:t>
+            </a:r>
+            <a:endParaRPr sz="900"/>
           </a:p>
         </p:txBody>
       </p:sp>
+      <p:pic>
+        <p:nvPicPr>
+          <p:cNvPr id="332" name="Google Shape;332;p21"/>
+          <p:cNvPicPr preferRelativeResize="0"/>
+          <p:nvPr/>
+        </p:nvPicPr>
+        <p:blipFill>
+          <a:blip r:embed="rId3">
+            <a:alphaModFix/>
+          </a:blip>
+          <a:stretch>
+            <a:fillRect/>
+          </a:stretch>
+        </p:blipFill>
+        <p:spPr>
+          <a:xfrm>
+            <a:off x="2378750" y="1597950"/>
+            <a:ext cx="4386488" cy="1442250"/>
+          </a:xfrm>
+          <a:prstGeom prst="rect">
+            <a:avLst/>
+          </a:prstGeom>
+          <a:noFill/>
+          <a:ln>
+            <a:noFill/>
+          </a:ln>
+        </p:spPr>
+      </p:pic>
+      <p:sp>
+        <p:nvSpPr>
+          <p:cNvPr id="333" name="Google Shape;333;p21"/>
+          <p:cNvSpPr txBox="1"/>
+          <p:nvPr/>
+        </p:nvSpPr>
+        <p:spPr>
+          <a:xfrm>
+            <a:off x="1303800" y="3040200"/>
+            <a:ext cx="6939300" cy="338700"/>
+          </a:xfrm>
+          <a:prstGeom prst="rect">
+            <a:avLst/>
+          </a:prstGeom>
+          <a:noFill/>
+          <a:ln>
+            <a:noFill/>
+          </a:ln>
+        </p:spPr>
+        <p:txBody>
+          <a:bodyPr spcFirstLastPara="1" wrap="square" lIns="91425" tIns="91425" rIns="91425" bIns="91425" anchor="t" anchorCtr="0">
+            <a:spAutoFit/>
+          </a:bodyPr>
+          <a:lstStyle/>
+          <a:p>
+            <a:pPr marL="0" lvl="0" indent="0" algn="l" rtl="0">
+              <a:lnSpc>
+                <a:spcPct val="115000"/>
+              </a:lnSpc>
+              <a:spcBef>
+                <a:spcPts val="0"/>
+              </a:spcBef>
+              <a:spcAft>
+                <a:spcPts val="1200"/>
+              </a:spcAft>
+              <a:buNone/>
+            </a:pPr>
+            <a:r>
+              <a:rPr lang="en" sz="1000">
+                <a:solidFill>
+                  <a:schemeClr val="dk2"/>
+                </a:solidFill>
+                <a:latin typeface="Nunito"/>
+                <a:ea typeface="Nunito"/>
+                <a:cs typeface="Nunito"/>
+                <a:sym typeface="Nunito"/>
+              </a:rPr>
+              <a:t>Final state veteran data output removing the state/county concern and having percents converted to whole numbers</a:t>
+            </a:r>
+            <a:endParaRPr sz="1200"/>
+          </a:p>
+        </p:txBody>
+      </p:sp>
+      <p:pic>
+        <p:nvPicPr>
+          <p:cNvPr id="334" name="Google Shape;334;p21"/>
+          <p:cNvPicPr preferRelativeResize="0"/>
+          <p:nvPr/>
+        </p:nvPicPr>
+        <p:blipFill>
+          <a:blip r:embed="rId4">
+            <a:alphaModFix/>
+          </a:blip>
+          <a:stretch>
+            <a:fillRect/>
+          </a:stretch>
+        </p:blipFill>
+        <p:spPr>
+          <a:xfrm>
+            <a:off x="1303800" y="3531300"/>
+            <a:ext cx="6707176" cy="1459800"/>
+          </a:xfrm>
+          <a:prstGeom prst="rect">
+            <a:avLst/>
+          </a:prstGeom>
+          <a:noFill/>
+          <a:ln>
+            <a:noFill/>
+          </a:ln>
+        </p:spPr>
+      </p:pic>
     </p:spTree>
   </p:cSld>
   <p:clrMapOvr>

</xml_diff>

<commit_message>
adding updated presentation with Postgres slide
</commit_message>
<xml_diff>
--- a/Final Project Google Slides.pptx
+++ b/Final Project Google Slides.pptx
@@ -949,7 +949,7 @@
   <p:cSld>
     <p:spTree>
       <p:nvGrpSpPr>
-        <p:cNvPr id="1" name="Shape 341"/>
+        <p:cNvPr id="1" name="Shape 342"/>
         <p:cNvGrpSpPr/>
         <p:nvPr/>
       </p:nvGrpSpPr>
@@ -963,7 +963,7 @@
       </p:grpSpPr>
       <p:sp>
         <p:nvSpPr>
-          <p:cNvPr id="342" name="Google Shape;342;g1156f46ef80_0_310:notes"/>
+          <p:cNvPr id="343" name="Google Shape;343;g1156f46ef80_0_310:notes"/>
           <p:cNvSpPr>
             <a:spLocks noGrp="1" noRot="1" noChangeAspect="1"/>
           </p:cNvSpPr>
@@ -1004,7 +1004,7 @@
       </p:sp>
       <p:sp>
         <p:nvSpPr>
-          <p:cNvPr id="343" name="Google Shape;343;g1156f46ef80_0_310:notes"/>
+          <p:cNvPr id="344" name="Google Shape;344;g1156f46ef80_0_310:notes"/>
           <p:cNvSpPr txBox="1">
             <a:spLocks noGrp="1"/>
           </p:cNvSpPr>
@@ -1053,7 +1053,7 @@
   <p:cSld>
     <p:spTree>
       <p:nvGrpSpPr>
-        <p:cNvPr id="1" name="Shape 347"/>
+        <p:cNvPr id="1" name="Shape 348"/>
         <p:cNvGrpSpPr/>
         <p:nvPr/>
       </p:nvGrpSpPr>
@@ -1067,7 +1067,7 @@
       </p:grpSpPr>
       <p:sp>
         <p:nvSpPr>
-          <p:cNvPr id="348" name="Google Shape;348;g1156f46ef80_0_315:notes"/>
+          <p:cNvPr id="349" name="Google Shape;349;g1156f46ef80_0_315:notes"/>
           <p:cNvSpPr>
             <a:spLocks noGrp="1" noRot="1" noChangeAspect="1"/>
           </p:cNvSpPr>
@@ -1108,7 +1108,7 @@
       </p:sp>
       <p:sp>
         <p:nvSpPr>
-          <p:cNvPr id="349" name="Google Shape;349;g1156f46ef80_0_315:notes"/>
+          <p:cNvPr id="350" name="Google Shape;350;g1156f46ef80_0_315:notes"/>
           <p:cNvSpPr txBox="1">
             <a:spLocks noGrp="1"/>
           </p:cNvSpPr>
@@ -1157,7 +1157,7 @@
   <p:cSld>
     <p:spTree>
       <p:nvGrpSpPr>
-        <p:cNvPr id="1" name="Shape 353"/>
+        <p:cNvPr id="1" name="Shape 354"/>
         <p:cNvGrpSpPr/>
         <p:nvPr/>
       </p:nvGrpSpPr>
@@ -1171,7 +1171,7 @@
       </p:grpSpPr>
       <p:sp>
         <p:nvSpPr>
-          <p:cNvPr id="354" name="Google Shape;354;g1156f46ef80_0_320:notes"/>
+          <p:cNvPr id="355" name="Google Shape;355;g1156f46ef80_0_320:notes"/>
           <p:cNvSpPr>
             <a:spLocks noGrp="1" noRot="1" noChangeAspect="1"/>
           </p:cNvSpPr>
@@ -1212,7 +1212,7 @@
       </p:sp>
       <p:sp>
         <p:nvSpPr>
-          <p:cNvPr id="355" name="Google Shape;355;g1156f46ef80_0_320:notes"/>
+          <p:cNvPr id="356" name="Google Shape;356;g1156f46ef80_0_320:notes"/>
           <p:cNvSpPr txBox="1">
             <a:spLocks noGrp="1"/>
           </p:cNvSpPr>
@@ -1261,7 +1261,7 @@
   <p:cSld>
     <p:spTree>
       <p:nvGrpSpPr>
-        <p:cNvPr id="1" name="Shape 359"/>
+        <p:cNvPr id="1" name="Shape 360"/>
         <p:cNvGrpSpPr/>
         <p:nvPr/>
       </p:nvGrpSpPr>
@@ -1275,7 +1275,7 @@
       </p:grpSpPr>
       <p:sp>
         <p:nvSpPr>
-          <p:cNvPr id="360" name="Google Shape;360;g1156f46ef80_0_326:notes"/>
+          <p:cNvPr id="361" name="Google Shape;361;g1156f46ef80_0_326:notes"/>
           <p:cNvSpPr>
             <a:spLocks noGrp="1" noRot="1" noChangeAspect="1"/>
           </p:cNvSpPr>
@@ -1316,7 +1316,7 @@
       </p:sp>
       <p:sp>
         <p:nvSpPr>
-          <p:cNvPr id="361" name="Google Shape;361;g1156f46ef80_0_326:notes"/>
+          <p:cNvPr id="362" name="Google Shape;362;g1156f46ef80_0_326:notes"/>
           <p:cNvSpPr txBox="1">
             <a:spLocks noGrp="1"/>
           </p:cNvSpPr>
@@ -1365,7 +1365,7 @@
   <p:cSld>
     <p:spTree>
       <p:nvGrpSpPr>
-        <p:cNvPr id="1" name="Shape 365"/>
+        <p:cNvPr id="1" name="Shape 366"/>
         <p:cNvGrpSpPr/>
         <p:nvPr/>
       </p:nvGrpSpPr>
@@ -1379,7 +1379,7 @@
       </p:grpSpPr>
       <p:sp>
         <p:nvSpPr>
-          <p:cNvPr id="366" name="Google Shape;366;g11771f64633_0_26:notes"/>
+          <p:cNvPr id="367" name="Google Shape;367;g11771f64633_0_26:notes"/>
           <p:cNvSpPr>
             <a:spLocks noGrp="1" noRot="1" noChangeAspect="1"/>
           </p:cNvSpPr>
@@ -1420,7 +1420,7 @@
       </p:sp>
       <p:sp>
         <p:nvSpPr>
-          <p:cNvPr id="367" name="Google Shape;367;g11771f64633_0_26:notes"/>
+          <p:cNvPr id="368" name="Google Shape;368;g11771f64633_0_26:notes"/>
           <p:cNvSpPr txBox="1">
             <a:spLocks noGrp="1"/>
           </p:cNvSpPr>
@@ -1469,7 +1469,7 @@
   <p:cSld>
     <p:spTree>
       <p:nvGrpSpPr>
-        <p:cNvPr id="1" name="Shape 371"/>
+        <p:cNvPr id="1" name="Shape 372"/>
         <p:cNvGrpSpPr/>
         <p:nvPr/>
       </p:nvGrpSpPr>
@@ -1483,7 +1483,7 @@
       </p:grpSpPr>
       <p:sp>
         <p:nvSpPr>
-          <p:cNvPr id="372" name="Google Shape;372;g11771f64633_0_68:notes"/>
+          <p:cNvPr id="373" name="Google Shape;373;g11771f64633_0_68:notes"/>
           <p:cNvSpPr>
             <a:spLocks noGrp="1" noRot="1" noChangeAspect="1"/>
           </p:cNvSpPr>
@@ -1524,7 +1524,7 @@
       </p:sp>
       <p:sp>
         <p:nvSpPr>
-          <p:cNvPr id="373" name="Google Shape;373;g11771f64633_0_68:notes"/>
+          <p:cNvPr id="374" name="Google Shape;374;g11771f64633_0_68:notes"/>
           <p:cNvSpPr txBox="1">
             <a:spLocks noGrp="1"/>
           </p:cNvSpPr>
@@ -1573,7 +1573,7 @@
   <p:cSld>
     <p:spTree>
       <p:nvGrpSpPr>
-        <p:cNvPr id="1" name="Shape 377"/>
+        <p:cNvPr id="1" name="Shape 378"/>
         <p:cNvGrpSpPr/>
         <p:nvPr/>
       </p:nvGrpSpPr>
@@ -1587,7 +1587,7 @@
       </p:grpSpPr>
       <p:sp>
         <p:nvSpPr>
-          <p:cNvPr id="378" name="Google Shape;378;g11771f64633_0_33:notes"/>
+          <p:cNvPr id="379" name="Google Shape;379;g11771f64633_0_33:notes"/>
           <p:cNvSpPr>
             <a:spLocks noGrp="1" noRot="1" noChangeAspect="1"/>
           </p:cNvSpPr>
@@ -1628,7 +1628,7 @@
       </p:sp>
       <p:sp>
         <p:nvSpPr>
-          <p:cNvPr id="379" name="Google Shape;379;g11771f64633_0_33:notes"/>
+          <p:cNvPr id="380" name="Google Shape;380;g11771f64633_0_33:notes"/>
           <p:cNvSpPr txBox="1">
             <a:spLocks noGrp="1"/>
           </p:cNvSpPr>
@@ -1677,7 +1677,7 @@
   <p:cSld>
     <p:spTree>
       <p:nvGrpSpPr>
-        <p:cNvPr id="1" name="Shape 383"/>
+        <p:cNvPr id="1" name="Shape 384"/>
         <p:cNvGrpSpPr/>
         <p:nvPr/>
       </p:nvGrpSpPr>
@@ -1691,7 +1691,7 @@
       </p:grpSpPr>
       <p:sp>
         <p:nvSpPr>
-          <p:cNvPr id="384" name="Google Shape;384;g11771f64633_0_39:notes"/>
+          <p:cNvPr id="385" name="Google Shape;385;g11771f64633_0_39:notes"/>
           <p:cNvSpPr>
             <a:spLocks noGrp="1" noRot="1" noChangeAspect="1"/>
           </p:cNvSpPr>
@@ -1732,7 +1732,7 @@
       </p:sp>
       <p:sp>
         <p:nvSpPr>
-          <p:cNvPr id="385" name="Google Shape;385;g11771f64633_0_39:notes"/>
+          <p:cNvPr id="386" name="Google Shape;386;g11771f64633_0_39:notes"/>
           <p:cNvSpPr txBox="1">
             <a:spLocks noGrp="1"/>
           </p:cNvSpPr>
@@ -1781,7 +1781,7 @@
   <p:cSld>
     <p:spTree>
       <p:nvGrpSpPr>
-        <p:cNvPr id="1" name="Shape 388"/>
+        <p:cNvPr id="1" name="Shape 389"/>
         <p:cNvGrpSpPr/>
         <p:nvPr/>
       </p:nvGrpSpPr>
@@ -1795,7 +1795,7 @@
       </p:grpSpPr>
       <p:sp>
         <p:nvSpPr>
-          <p:cNvPr id="389" name="Google Shape;389;g11771f64633_0_44:notes"/>
+          <p:cNvPr id="390" name="Google Shape;390;g11771f64633_0_44:notes"/>
           <p:cNvSpPr>
             <a:spLocks noGrp="1" noRot="1" noChangeAspect="1"/>
           </p:cNvSpPr>
@@ -1836,7 +1836,7 @@
       </p:sp>
       <p:sp>
         <p:nvSpPr>
-          <p:cNvPr id="390" name="Google Shape;390;g11771f64633_0_44:notes"/>
+          <p:cNvPr id="391" name="Google Shape;391;g11771f64633_0_44:notes"/>
           <p:cNvSpPr txBox="1">
             <a:spLocks noGrp="1"/>
           </p:cNvSpPr>
@@ -1989,7 +1989,7 @@
   <p:cSld>
     <p:spTree>
       <p:nvGrpSpPr>
-        <p:cNvPr id="1" name="Shape 394"/>
+        <p:cNvPr id="1" name="Shape 395"/>
         <p:cNvGrpSpPr/>
         <p:nvPr/>
       </p:nvGrpSpPr>
@@ -2003,7 +2003,7 @@
       </p:grpSpPr>
       <p:sp>
         <p:nvSpPr>
-          <p:cNvPr id="395" name="Google Shape;395;g11771f64633_0_50:notes"/>
+          <p:cNvPr id="396" name="Google Shape;396;g11771f64633_0_50:notes"/>
           <p:cNvSpPr>
             <a:spLocks noGrp="1" noRot="1" noChangeAspect="1"/>
           </p:cNvSpPr>
@@ -2044,7 +2044,7 @@
       </p:sp>
       <p:sp>
         <p:nvSpPr>
-          <p:cNvPr id="396" name="Google Shape;396;g11771f64633_0_50:notes"/>
+          <p:cNvPr id="397" name="Google Shape;397;g11771f64633_0_50:notes"/>
           <p:cNvSpPr txBox="1">
             <a:spLocks noGrp="1"/>
           </p:cNvSpPr>
@@ -2093,7 +2093,7 @@
   <p:cSld>
     <p:spTree>
       <p:nvGrpSpPr>
-        <p:cNvPr id="1" name="Shape 400"/>
+        <p:cNvPr id="1" name="Shape 401"/>
         <p:cNvGrpSpPr/>
         <p:nvPr/>
       </p:nvGrpSpPr>
@@ -2107,7 +2107,7 @@
       </p:grpSpPr>
       <p:sp>
         <p:nvSpPr>
-          <p:cNvPr id="401" name="Google Shape;401;g11771f64633_0_56:notes"/>
+          <p:cNvPr id="402" name="Google Shape;402;g11771f64633_0_56:notes"/>
           <p:cNvSpPr>
             <a:spLocks noGrp="1" noRot="1" noChangeAspect="1"/>
           </p:cNvSpPr>
@@ -2148,7 +2148,7 @@
       </p:sp>
       <p:sp>
         <p:nvSpPr>
-          <p:cNvPr id="402" name="Google Shape;402;g11771f64633_0_56:notes"/>
+          <p:cNvPr id="403" name="Google Shape;403;g11771f64633_0_56:notes"/>
           <p:cNvSpPr txBox="1">
             <a:spLocks noGrp="1"/>
           </p:cNvSpPr>
@@ -2197,7 +2197,7 @@
   <p:cSld>
     <p:spTree>
       <p:nvGrpSpPr>
-        <p:cNvPr id="1" name="Shape 406"/>
+        <p:cNvPr id="1" name="Shape 407"/>
         <p:cNvGrpSpPr/>
         <p:nvPr/>
       </p:nvGrpSpPr>
@@ -2211,7 +2211,7 @@
       </p:grpSpPr>
       <p:sp>
         <p:nvSpPr>
-          <p:cNvPr id="407" name="Google Shape;407;g11771f64633_0_62:notes"/>
+          <p:cNvPr id="408" name="Google Shape;408;g11771f64633_0_62:notes"/>
           <p:cNvSpPr>
             <a:spLocks noGrp="1" noRot="1" noChangeAspect="1"/>
           </p:cNvSpPr>
@@ -2252,7 +2252,7 @@
       </p:sp>
       <p:sp>
         <p:nvSpPr>
-          <p:cNvPr id="408" name="Google Shape;408;g11771f64633_0_62:notes"/>
+          <p:cNvPr id="409" name="Google Shape;409;g11771f64633_0_62:notes"/>
           <p:cNvSpPr txBox="1">
             <a:spLocks noGrp="1"/>
           </p:cNvSpPr>
@@ -17067,7 +17067,130 @@
             </a:pPr>
             <a:r>
               <a:rPr lang="en"/>
-              <a:t>Postgres (insert here)</a:t>
+              <a:t>Postgres </a:t>
+            </a:r>
+            <a:endParaRPr/>
+          </a:p>
+        </p:txBody>
+      </p:sp>
+      <p:pic>
+        <p:nvPicPr>
+          <p:cNvPr id="340" name="Google Shape;340;p22"/>
+          <p:cNvPicPr preferRelativeResize="0"/>
+          <p:nvPr/>
+        </p:nvPicPr>
+        <p:blipFill>
+          <a:blip r:embed="rId3">
+            <a:alphaModFix/>
+          </a:blip>
+          <a:stretch>
+            <a:fillRect/>
+          </a:stretch>
+        </p:blipFill>
+        <p:spPr>
+          <a:xfrm>
+            <a:off x="2231100" y="1363350"/>
+            <a:ext cx="6640874" cy="3488150"/>
+          </a:xfrm>
+          <a:prstGeom prst="rect">
+            <a:avLst/>
+          </a:prstGeom>
+          <a:noFill/>
+          <a:ln>
+            <a:noFill/>
+          </a:ln>
+        </p:spPr>
+      </p:pic>
+      <p:pic>
+        <p:nvPicPr>
+          <p:cNvPr id="341" name="Google Shape;341;p22"/>
+          <p:cNvPicPr preferRelativeResize="0"/>
+          <p:nvPr/>
+        </p:nvPicPr>
+        <p:blipFill>
+          <a:blip r:embed="rId4">
+            <a:alphaModFix/>
+          </a:blip>
+          <a:stretch>
+            <a:fillRect/>
+          </a:stretch>
+        </p:blipFill>
+        <p:spPr>
+          <a:xfrm>
+            <a:off x="315525" y="1363350"/>
+            <a:ext cx="1915575" cy="3488151"/>
+          </a:xfrm>
+          <a:prstGeom prst="rect">
+            <a:avLst/>
+          </a:prstGeom>
+          <a:noFill/>
+          <a:ln>
+            <a:noFill/>
+          </a:ln>
+        </p:spPr>
+      </p:pic>
+    </p:spTree>
+  </p:cSld>
+  <p:clrMapOvr>
+    <a:masterClrMapping/>
+  </p:clrMapOvr>
+</p:sld>
+</file>
+
+<file path=ppt/slides/slide11.xml><?xml version="1.0" encoding="utf-8"?>
+<p:sld xmlns:a="http://schemas.openxmlformats.org/drawingml/2006/main" xmlns:r="http://schemas.openxmlformats.org/officeDocument/2006/relationships" xmlns:p="http://schemas.openxmlformats.org/presentationml/2006/main">
+  <p:cSld>
+    <p:spTree>
+      <p:nvGrpSpPr>
+        <p:cNvPr id="1" name="Shape 345"/>
+        <p:cNvGrpSpPr/>
+        <p:nvPr/>
+      </p:nvGrpSpPr>
+      <p:grpSpPr>
+        <a:xfrm>
+          <a:off x="0" y="0"/>
+          <a:ext cx="0" cy="0"/>
+          <a:chOff x="0" y="0"/>
+          <a:chExt cx="0" cy="0"/>
+        </a:xfrm>
+      </p:grpSpPr>
+      <p:sp>
+        <p:nvSpPr>
+          <p:cNvPr id="346" name="Google Shape;346;p23"/>
+          <p:cNvSpPr txBox="1">
+            <a:spLocks noGrp="1"/>
+          </p:cNvSpPr>
+          <p:nvPr>
+            <p:ph type="title"/>
+          </p:nvPr>
+        </p:nvSpPr>
+        <p:spPr>
+          <a:xfrm>
+            <a:off x="1303800" y="598575"/>
+            <a:ext cx="7030500" cy="999300"/>
+          </a:xfrm>
+          <a:prstGeom prst="rect">
+            <a:avLst/>
+          </a:prstGeom>
+        </p:spPr>
+        <p:txBody>
+          <a:bodyPr spcFirstLastPara="1" wrap="square" lIns="91425" tIns="91425" rIns="91425" bIns="91425" anchor="t" anchorCtr="0">
+            <a:normAutofit/>
+          </a:bodyPr>
+          <a:lstStyle/>
+          <a:p>
+            <a:pPr marL="0" lvl="0" indent="0" algn="l" rtl="0">
+              <a:spcBef>
+                <a:spcPts val="0"/>
+              </a:spcBef>
+              <a:spcAft>
+                <a:spcPts val="0"/>
+              </a:spcAft>
+              <a:buNone/>
+            </a:pPr>
+            <a:r>
+              <a:rPr lang="en"/>
+              <a:t>Machine Learning (insert here)</a:t>
             </a:r>
             <a:endParaRPr/>
           </a:p>
@@ -17075,7 +17198,7 @@
       </p:sp>
       <p:sp>
         <p:nvSpPr>
-          <p:cNvPr id="340" name="Google Shape;340;p22"/>
+          <p:cNvPr id="347" name="Google Shape;347;p23"/>
           <p:cNvSpPr txBox="1">
             <a:spLocks noGrp="1"/>
           </p:cNvSpPr>
@@ -17119,12 +17242,12 @@
 </p:sld>
 </file>
 
-<file path=ppt/slides/slide11.xml><?xml version="1.0" encoding="utf-8"?>
+<file path=ppt/slides/slide12.xml><?xml version="1.0" encoding="utf-8"?>
 <p:sld xmlns:a="http://schemas.openxmlformats.org/drawingml/2006/main" xmlns:r="http://schemas.openxmlformats.org/officeDocument/2006/relationships" xmlns:p="http://schemas.openxmlformats.org/presentationml/2006/main">
   <p:cSld>
     <p:spTree>
       <p:nvGrpSpPr>
-        <p:cNvPr id="1" name="Shape 344"/>
+        <p:cNvPr id="1" name="Shape 351"/>
         <p:cNvGrpSpPr/>
         <p:nvPr/>
       </p:nvGrpSpPr>
@@ -17138,7 +17261,7 @@
       </p:grpSpPr>
       <p:sp>
         <p:nvSpPr>
-          <p:cNvPr id="345" name="Google Shape;345;p23"/>
+          <p:cNvPr id="352" name="Google Shape;352;p24"/>
           <p:cNvSpPr txBox="1">
             <a:spLocks noGrp="1"/>
           </p:cNvSpPr>
@@ -17172,7 +17295,7 @@
             </a:pPr>
             <a:r>
               <a:rPr lang="en"/>
-              <a:t>Machine Learning (insert here)</a:t>
+              <a:t>Machine Learning Results (insert here)</a:t>
             </a:r>
             <a:endParaRPr/>
           </a:p>
@@ -17180,7 +17303,7 @@
       </p:sp>
       <p:sp>
         <p:nvSpPr>
-          <p:cNvPr id="346" name="Google Shape;346;p23"/>
+          <p:cNvPr id="353" name="Google Shape;353;p24"/>
           <p:cNvSpPr txBox="1">
             <a:spLocks noGrp="1"/>
           </p:cNvSpPr>
@@ -17224,12 +17347,12 @@
 </p:sld>
 </file>
 
-<file path=ppt/slides/slide12.xml><?xml version="1.0" encoding="utf-8"?>
+<file path=ppt/slides/slide13.xml><?xml version="1.0" encoding="utf-8"?>
 <p:sld xmlns:a="http://schemas.openxmlformats.org/drawingml/2006/main" xmlns:r="http://schemas.openxmlformats.org/officeDocument/2006/relationships" xmlns:p="http://schemas.openxmlformats.org/presentationml/2006/main">
   <p:cSld>
     <p:spTree>
       <p:nvGrpSpPr>
-        <p:cNvPr id="1" name="Shape 350"/>
+        <p:cNvPr id="1" name="Shape 357"/>
         <p:cNvGrpSpPr/>
         <p:nvPr/>
       </p:nvGrpSpPr>
@@ -17243,7 +17366,7 @@
       </p:grpSpPr>
       <p:sp>
         <p:nvSpPr>
-          <p:cNvPr id="351" name="Google Shape;351;p24"/>
+          <p:cNvPr id="358" name="Google Shape;358;p25"/>
           <p:cNvSpPr txBox="1">
             <a:spLocks noGrp="1"/>
           </p:cNvSpPr>
@@ -17277,7 +17400,7 @@
             </a:pPr>
             <a:r>
               <a:rPr lang="en"/>
-              <a:t>Machine Learning Results (insert here)</a:t>
+              <a:t>Visualization</a:t>
             </a:r>
             <a:endParaRPr/>
           </a:p>
@@ -17285,7 +17408,7 @@
       </p:sp>
       <p:sp>
         <p:nvSpPr>
-          <p:cNvPr id="352" name="Google Shape;352;p24"/>
+          <p:cNvPr id="359" name="Google Shape;359;p25"/>
           <p:cNvSpPr txBox="1">
             <a:spLocks noGrp="1"/>
           </p:cNvSpPr>
@@ -17313,111 +17436,6 @@
                 <a:spcPts val="0"/>
               </a:spcBef>
               <a:spcAft>
-                <a:spcPts val="1200"/>
-              </a:spcAft>
-              <a:buNone/>
-            </a:pPr>
-            <a:endParaRPr/>
-          </a:p>
-        </p:txBody>
-      </p:sp>
-    </p:spTree>
-  </p:cSld>
-  <p:clrMapOvr>
-    <a:masterClrMapping/>
-  </p:clrMapOvr>
-</p:sld>
-</file>
-
-<file path=ppt/slides/slide13.xml><?xml version="1.0" encoding="utf-8"?>
-<p:sld xmlns:a="http://schemas.openxmlformats.org/drawingml/2006/main" xmlns:r="http://schemas.openxmlformats.org/officeDocument/2006/relationships" xmlns:p="http://schemas.openxmlformats.org/presentationml/2006/main">
-  <p:cSld>
-    <p:spTree>
-      <p:nvGrpSpPr>
-        <p:cNvPr id="1" name="Shape 356"/>
-        <p:cNvGrpSpPr/>
-        <p:nvPr/>
-      </p:nvGrpSpPr>
-      <p:grpSpPr>
-        <a:xfrm>
-          <a:off x="0" y="0"/>
-          <a:ext cx="0" cy="0"/>
-          <a:chOff x="0" y="0"/>
-          <a:chExt cx="0" cy="0"/>
-        </a:xfrm>
-      </p:grpSpPr>
-      <p:sp>
-        <p:nvSpPr>
-          <p:cNvPr id="357" name="Google Shape;357;p25"/>
-          <p:cNvSpPr txBox="1">
-            <a:spLocks noGrp="1"/>
-          </p:cNvSpPr>
-          <p:nvPr>
-            <p:ph type="title"/>
-          </p:nvPr>
-        </p:nvSpPr>
-        <p:spPr>
-          <a:xfrm>
-            <a:off x="1303800" y="598575"/>
-            <a:ext cx="7030500" cy="999300"/>
-          </a:xfrm>
-          <a:prstGeom prst="rect">
-            <a:avLst/>
-          </a:prstGeom>
-        </p:spPr>
-        <p:txBody>
-          <a:bodyPr spcFirstLastPara="1" wrap="square" lIns="91425" tIns="91425" rIns="91425" bIns="91425" anchor="t" anchorCtr="0">
-            <a:normAutofit/>
-          </a:bodyPr>
-          <a:lstStyle/>
-          <a:p>
-            <a:pPr marL="0" lvl="0" indent="0" algn="l" rtl="0">
-              <a:spcBef>
-                <a:spcPts val="0"/>
-              </a:spcBef>
-              <a:spcAft>
-                <a:spcPts val="0"/>
-              </a:spcAft>
-              <a:buNone/>
-            </a:pPr>
-            <a:r>
-              <a:rPr lang="en"/>
-              <a:t>Visualization</a:t>
-            </a:r>
-            <a:endParaRPr/>
-          </a:p>
-        </p:txBody>
-      </p:sp>
-      <p:sp>
-        <p:nvSpPr>
-          <p:cNvPr id="358" name="Google Shape;358;p25"/>
-          <p:cNvSpPr txBox="1">
-            <a:spLocks noGrp="1"/>
-          </p:cNvSpPr>
-          <p:nvPr>
-            <p:ph type="body" idx="1"/>
-          </p:nvPr>
-        </p:nvSpPr>
-        <p:spPr>
-          <a:xfrm>
-            <a:off x="1303800" y="1990050"/>
-            <a:ext cx="7030500" cy="2541600"/>
-          </a:xfrm>
-          <a:prstGeom prst="rect">
-            <a:avLst/>
-          </a:prstGeom>
-        </p:spPr>
-        <p:txBody>
-          <a:bodyPr spcFirstLastPara="1" wrap="square" lIns="91425" tIns="91425" rIns="91425" bIns="91425" anchor="t" anchorCtr="0">
-            <a:normAutofit/>
-          </a:bodyPr>
-          <a:lstStyle/>
-          <a:p>
-            <a:pPr marL="0" lvl="0" indent="0" algn="l" rtl="0">
-              <a:spcBef>
-                <a:spcPts val="0"/>
-              </a:spcBef>
-              <a:spcAft>
                 <a:spcPts val="0"/>
               </a:spcAft>
               <a:buNone/>
@@ -17480,7 +17498,7 @@
   <p:cSld>
     <p:spTree>
       <p:nvGrpSpPr>
-        <p:cNvPr id="1" name="Shape 362"/>
+        <p:cNvPr id="1" name="Shape 363"/>
         <p:cNvGrpSpPr/>
         <p:nvPr/>
       </p:nvGrpSpPr>
@@ -17494,7 +17512,7 @@
       </p:grpSpPr>
       <p:sp>
         <p:nvSpPr>
-          <p:cNvPr id="363" name="Google Shape;363;p26"/>
+          <p:cNvPr id="364" name="Google Shape;364;p26"/>
           <p:cNvSpPr txBox="1">
             <a:spLocks noGrp="1"/>
           </p:cNvSpPr>
@@ -17536,7 +17554,7 @@
       </p:sp>
       <p:pic>
         <p:nvPicPr>
-          <p:cNvPr id="364" name="Google Shape;364;p26"/>
+          <p:cNvPr id="365" name="Google Shape;365;p26"/>
           <p:cNvPicPr preferRelativeResize="0"/>
           <p:nvPr/>
         </p:nvPicPr>
@@ -17575,7 +17593,7 @@
   <p:cSld>
     <p:spTree>
       <p:nvGrpSpPr>
-        <p:cNvPr id="1" name="Shape 368"/>
+        <p:cNvPr id="1" name="Shape 369"/>
         <p:cNvGrpSpPr/>
         <p:nvPr/>
       </p:nvGrpSpPr>
@@ -17589,7 +17607,7 @@
       </p:grpSpPr>
       <p:sp>
         <p:nvSpPr>
-          <p:cNvPr id="369" name="Google Shape;369;p27"/>
+          <p:cNvPr id="370" name="Google Shape;370;p27"/>
           <p:cNvSpPr txBox="1">
             <a:spLocks noGrp="1"/>
           </p:cNvSpPr>
@@ -17631,7 +17649,7 @@
       </p:sp>
       <p:pic>
         <p:nvPicPr>
-          <p:cNvPr id="370" name="Google Shape;370;p27"/>
+          <p:cNvPr id="371" name="Google Shape;371;p27"/>
           <p:cNvPicPr preferRelativeResize="0"/>
           <p:nvPr/>
         </p:nvPicPr>
@@ -17670,7 +17688,7 @@
   <p:cSld>
     <p:spTree>
       <p:nvGrpSpPr>
-        <p:cNvPr id="1" name="Shape 374"/>
+        <p:cNvPr id="1" name="Shape 375"/>
         <p:cNvGrpSpPr/>
         <p:nvPr/>
       </p:nvGrpSpPr>
@@ -17684,7 +17702,7 @@
       </p:grpSpPr>
       <p:sp>
         <p:nvSpPr>
-          <p:cNvPr id="375" name="Google Shape;375;p28"/>
+          <p:cNvPr id="376" name="Google Shape;376;p28"/>
           <p:cNvSpPr txBox="1">
             <a:spLocks noGrp="1"/>
           </p:cNvSpPr>
@@ -17727,7 +17745,7 @@
       </p:sp>
       <p:pic>
         <p:nvPicPr>
-          <p:cNvPr id="376" name="Google Shape;376;p28"/>
+          <p:cNvPr id="377" name="Google Shape;377;p28"/>
           <p:cNvPicPr preferRelativeResize="0"/>
           <p:nvPr/>
         </p:nvPicPr>
@@ -17766,7 +17784,7 @@
   <p:cSld>
     <p:spTree>
       <p:nvGrpSpPr>
-        <p:cNvPr id="1" name="Shape 380"/>
+        <p:cNvPr id="1" name="Shape 381"/>
         <p:cNvGrpSpPr/>
         <p:nvPr/>
       </p:nvGrpSpPr>
@@ -17780,7 +17798,7 @@
       </p:grpSpPr>
       <p:sp>
         <p:nvSpPr>
-          <p:cNvPr id="381" name="Google Shape;381;p29"/>
+          <p:cNvPr id="382" name="Google Shape;382;p29"/>
           <p:cNvSpPr txBox="1">
             <a:spLocks noGrp="1"/>
           </p:cNvSpPr>
@@ -17823,7 +17841,7 @@
       </p:sp>
       <p:pic>
         <p:nvPicPr>
-          <p:cNvPr id="382" name="Google Shape;382;p29"/>
+          <p:cNvPr id="383" name="Google Shape;383;p29"/>
           <p:cNvPicPr preferRelativeResize="0"/>
           <p:nvPr/>
         </p:nvPicPr>
@@ -17862,7 +17880,7 @@
   <p:cSld>
     <p:spTree>
       <p:nvGrpSpPr>
-        <p:cNvPr id="1" name="Shape 386"/>
+        <p:cNvPr id="1" name="Shape 387"/>
         <p:cNvGrpSpPr/>
         <p:nvPr/>
       </p:nvGrpSpPr>
@@ -17876,7 +17894,7 @@
       </p:grpSpPr>
       <p:sp>
         <p:nvSpPr>
-          <p:cNvPr id="387" name="Google Shape;387;p30"/>
+          <p:cNvPr id="388" name="Google Shape;388;p30"/>
           <p:cNvSpPr txBox="1">
             <a:spLocks noGrp="1"/>
           </p:cNvSpPr>
@@ -17930,7 +17948,7 @@
   <p:cSld>
     <p:spTree>
       <p:nvGrpSpPr>
-        <p:cNvPr id="1" name="Shape 391"/>
+        <p:cNvPr id="1" name="Shape 392"/>
         <p:cNvGrpSpPr/>
         <p:nvPr/>
       </p:nvGrpSpPr>
@@ -17944,7 +17962,7 @@
       </p:grpSpPr>
       <p:sp>
         <p:nvSpPr>
-          <p:cNvPr id="392" name="Google Shape;392;p31"/>
+          <p:cNvPr id="393" name="Google Shape;393;p31"/>
           <p:cNvSpPr txBox="1">
             <a:spLocks noGrp="1"/>
           </p:cNvSpPr>
@@ -18004,7 +18022,7 @@
       </p:sp>
       <p:pic>
         <p:nvPicPr>
-          <p:cNvPr id="393" name="Google Shape;393;p31"/>
+          <p:cNvPr id="394" name="Google Shape;394;p31"/>
           <p:cNvPicPr preferRelativeResize="0"/>
           <p:nvPr/>
         </p:nvPicPr>
@@ -18247,7 +18265,7 @@
   <p:cSld>
     <p:spTree>
       <p:nvGrpSpPr>
-        <p:cNvPr id="1" name="Shape 397"/>
+        <p:cNvPr id="1" name="Shape 398"/>
         <p:cNvGrpSpPr/>
         <p:nvPr/>
       </p:nvGrpSpPr>
@@ -18261,7 +18279,7 @@
       </p:grpSpPr>
       <p:sp>
         <p:nvSpPr>
-          <p:cNvPr id="398" name="Google Shape;398;p32"/>
+          <p:cNvPr id="399" name="Google Shape;399;p32"/>
           <p:cNvSpPr txBox="1">
             <a:spLocks noGrp="1"/>
           </p:cNvSpPr>
@@ -18321,7 +18339,7 @@
       </p:sp>
       <p:pic>
         <p:nvPicPr>
-          <p:cNvPr id="399" name="Google Shape;399;p32"/>
+          <p:cNvPr id="400" name="Google Shape;400;p32"/>
           <p:cNvPicPr preferRelativeResize="0"/>
           <p:nvPr/>
         </p:nvPicPr>
@@ -18360,7 +18378,7 @@
   <p:cSld>
     <p:spTree>
       <p:nvGrpSpPr>
-        <p:cNvPr id="1" name="Shape 403"/>
+        <p:cNvPr id="1" name="Shape 404"/>
         <p:cNvGrpSpPr/>
         <p:nvPr/>
       </p:nvGrpSpPr>
@@ -18374,7 +18392,7 @@
       </p:grpSpPr>
       <p:sp>
         <p:nvSpPr>
-          <p:cNvPr id="404" name="Google Shape;404;p33"/>
+          <p:cNvPr id="405" name="Google Shape;405;p33"/>
           <p:cNvSpPr txBox="1">
             <a:spLocks noGrp="1"/>
           </p:cNvSpPr>
@@ -18434,7 +18452,7 @@
       </p:sp>
       <p:pic>
         <p:nvPicPr>
-          <p:cNvPr id="405" name="Google Shape;405;p33"/>
+          <p:cNvPr id="406" name="Google Shape;406;p33"/>
           <p:cNvPicPr preferRelativeResize="0"/>
           <p:nvPr/>
         </p:nvPicPr>
@@ -18473,7 +18491,7 @@
   <p:cSld>
     <p:spTree>
       <p:nvGrpSpPr>
-        <p:cNvPr id="1" name="Shape 409"/>
+        <p:cNvPr id="1" name="Shape 410"/>
         <p:cNvGrpSpPr/>
         <p:nvPr/>
       </p:nvGrpSpPr>
@@ -18487,7 +18505,7 @@
       </p:grpSpPr>
       <p:sp>
         <p:nvSpPr>
-          <p:cNvPr id="410" name="Google Shape;410;p34"/>
+          <p:cNvPr id="411" name="Google Shape;411;p34"/>
           <p:cNvSpPr txBox="1">
             <a:spLocks noGrp="1"/>
           </p:cNvSpPr>
@@ -18547,7 +18565,7 @@
       </p:sp>
       <p:pic>
         <p:nvPicPr>
-          <p:cNvPr id="411" name="Google Shape;411;p34"/>
+          <p:cNvPr id="412" name="Google Shape;412;p34"/>
           <p:cNvPicPr preferRelativeResize="0"/>
           <p:nvPr/>
         </p:nvPicPr>

</xml_diff>

<commit_message>
adding updated google slide presentation
</commit_message>
<xml_diff>
--- a/Final Project Google Slides.pptx
+++ b/Final Project Google Slides.pptx
@@ -5,7 +5,7 @@
     <p:sldMasterId id="2147483659" r:id="rId1"/>
   </p:sldMasterIdLst>
   <p:notesMasterIdLst>
-    <p:notesMasterId r:id="rId24"/>
+    <p:notesMasterId r:id="rId23"/>
   </p:notesMasterIdLst>
   <p:sldIdLst>
     <p:sldId id="256" r:id="rId2"/>
@@ -18,33 +18,32 @@
     <p:sldId id="263" r:id="rId9"/>
     <p:sldId id="264" r:id="rId10"/>
     <p:sldId id="265" r:id="rId11"/>
-    <p:sldId id="266" r:id="rId12"/>
-    <p:sldId id="267" r:id="rId13"/>
+    <p:sldId id="267" r:id="rId12"/>
+    <p:sldId id="266" r:id="rId13"/>
     <p:sldId id="268" r:id="rId14"/>
     <p:sldId id="269" r:id="rId15"/>
     <p:sldId id="270" r:id="rId16"/>
     <p:sldId id="271" r:id="rId17"/>
     <p:sldId id="272" r:id="rId18"/>
-    <p:sldId id="273" r:id="rId19"/>
-    <p:sldId id="274" r:id="rId20"/>
-    <p:sldId id="275" r:id="rId21"/>
-    <p:sldId id="276" r:id="rId22"/>
-    <p:sldId id="277" r:id="rId23"/>
+    <p:sldId id="274" r:id="rId19"/>
+    <p:sldId id="275" r:id="rId20"/>
+    <p:sldId id="276" r:id="rId21"/>
+    <p:sldId id="277" r:id="rId22"/>
   </p:sldIdLst>
   <p:sldSz cx="9144000" cy="5143500" type="screen16x9"/>
   <p:notesSz cx="6858000" cy="9144000"/>
   <p:embeddedFontLst>
     <p:embeddedFont>
       <p:font typeface="Maven Pro" panose="020B0604020202020204" charset="0"/>
-      <p:regular r:id="rId25"/>
-      <p:bold r:id="rId26"/>
+      <p:regular r:id="rId24"/>
+      <p:bold r:id="rId25"/>
     </p:embeddedFont>
     <p:embeddedFont>
       <p:font typeface="Nunito" pitchFamily="2" charset="0"/>
-      <p:regular r:id="rId27"/>
-      <p:bold r:id="rId28"/>
-      <p:italic r:id="rId29"/>
-      <p:boldItalic r:id="rId30"/>
+      <p:regular r:id="rId26"/>
+      <p:bold r:id="rId27"/>
+      <p:italic r:id="rId28"/>
+      <p:boldItalic r:id="rId29"/>
     </p:embeddedFont>
   </p:embeddedFontLst>
   <p:defaultTextStyle>
@@ -765,8 +764,8 @@
         </p:nvSpPr>
         <p:spPr>
           <a:xfrm>
-            <a:off x="381300" y="685800"/>
-            <a:ext cx="6096075" cy="3429000"/>
+            <a:off x="381000" y="685800"/>
+            <a:ext cx="6096000" cy="3429000"/>
           </a:xfrm>
           <a:custGeom>
             <a:avLst/>
@@ -949,6 +948,110 @@
   <p:cSld>
     <p:spTree>
       <p:nvGrpSpPr>
+        <p:cNvPr id="1" name="Shape 348"/>
+        <p:cNvGrpSpPr/>
+        <p:nvPr/>
+      </p:nvGrpSpPr>
+      <p:grpSpPr>
+        <a:xfrm>
+          <a:off x="0" y="0"/>
+          <a:ext cx="0" cy="0"/>
+          <a:chOff x="0" y="0"/>
+          <a:chExt cx="0" cy="0"/>
+        </a:xfrm>
+      </p:grpSpPr>
+      <p:sp>
+        <p:nvSpPr>
+          <p:cNvPr id="349" name="Google Shape;349;g1156f46ef80_0_315:notes"/>
+          <p:cNvSpPr>
+            <a:spLocks noGrp="1" noRot="1" noChangeAspect="1"/>
+          </p:cNvSpPr>
+          <p:nvPr>
+            <p:ph type="sldImg" idx="2"/>
+          </p:nvPr>
+        </p:nvSpPr>
+        <p:spPr>
+          <a:xfrm>
+            <a:off x="381000" y="685800"/>
+            <a:ext cx="6096000" cy="3429000"/>
+          </a:xfrm>
+          <a:custGeom>
+            <a:avLst/>
+            <a:gdLst/>
+            <a:ahLst/>
+            <a:cxnLst/>
+            <a:rect l="l" t="t" r="r" b="b"/>
+            <a:pathLst>
+              <a:path w="120000" h="120000" extrusionOk="0">
+                <a:moveTo>
+                  <a:pt x="0" y="0"/>
+                </a:moveTo>
+                <a:lnTo>
+                  <a:pt x="120000" y="0"/>
+                </a:lnTo>
+                <a:lnTo>
+                  <a:pt x="120000" y="120000"/>
+                </a:lnTo>
+                <a:lnTo>
+                  <a:pt x="0" y="120000"/>
+                </a:lnTo>
+                <a:close/>
+              </a:path>
+            </a:pathLst>
+          </a:custGeom>
+        </p:spPr>
+      </p:sp>
+      <p:sp>
+        <p:nvSpPr>
+          <p:cNvPr id="350" name="Google Shape;350;g1156f46ef80_0_315:notes"/>
+          <p:cNvSpPr txBox="1">
+            <a:spLocks noGrp="1"/>
+          </p:cNvSpPr>
+          <p:nvPr>
+            <p:ph type="body" idx="1"/>
+          </p:nvPr>
+        </p:nvSpPr>
+        <p:spPr>
+          <a:xfrm>
+            <a:off x="685800" y="4343400"/>
+            <a:ext cx="5486400" cy="4114800"/>
+          </a:xfrm>
+          <a:prstGeom prst="rect">
+            <a:avLst/>
+          </a:prstGeom>
+        </p:spPr>
+        <p:txBody>
+          <a:bodyPr spcFirstLastPara="1" wrap="square" lIns="91425" tIns="91425" rIns="91425" bIns="91425" anchor="t" anchorCtr="0">
+            <a:noAutofit/>
+          </a:bodyPr>
+          <a:lstStyle/>
+          <a:p>
+            <a:pPr marL="0" lvl="0" indent="0" algn="l" rtl="0">
+              <a:spcBef>
+                <a:spcPts val="0"/>
+              </a:spcBef>
+              <a:spcAft>
+                <a:spcPts val="0"/>
+              </a:spcAft>
+              <a:buNone/>
+            </a:pPr>
+            <a:endParaRPr/>
+          </a:p>
+        </p:txBody>
+      </p:sp>
+    </p:spTree>
+  </p:cSld>
+  <p:clrMapOvr>
+    <a:masterClrMapping/>
+  </p:clrMapOvr>
+</p:notes>
+</file>
+
+<file path=ppt/notesSlides/notesSlide12.xml><?xml version="1.0" encoding="utf-8"?>
+<p:notes xmlns:a="http://schemas.openxmlformats.org/drawingml/2006/main" xmlns:r="http://schemas.openxmlformats.org/officeDocument/2006/relationships" xmlns:p="http://schemas.openxmlformats.org/presentationml/2006/main" showMasterSp="0" showMasterPhAnim="0">
+  <p:cSld>
+    <p:spTree>
+      <p:nvGrpSpPr>
         <p:cNvPr id="1" name="Shape 342"/>
         <p:cNvGrpSpPr/>
         <p:nvPr/>
@@ -973,7 +1076,7 @@
         </p:nvSpPr>
         <p:spPr>
           <a:xfrm>
-            <a:off x="381300" y="685800"/>
+            <a:off x="381000" y="685800"/>
             <a:ext cx="6096000" cy="3429000"/>
           </a:xfrm>
           <a:custGeom>
@@ -1005,110 +1108,6 @@
       <p:sp>
         <p:nvSpPr>
           <p:cNvPr id="344" name="Google Shape;344;g1156f46ef80_0_310:notes"/>
-          <p:cNvSpPr txBox="1">
-            <a:spLocks noGrp="1"/>
-          </p:cNvSpPr>
-          <p:nvPr>
-            <p:ph type="body" idx="1"/>
-          </p:nvPr>
-        </p:nvSpPr>
-        <p:spPr>
-          <a:xfrm>
-            <a:off x="685800" y="4343400"/>
-            <a:ext cx="5486400" cy="4114800"/>
-          </a:xfrm>
-          <a:prstGeom prst="rect">
-            <a:avLst/>
-          </a:prstGeom>
-        </p:spPr>
-        <p:txBody>
-          <a:bodyPr spcFirstLastPara="1" wrap="square" lIns="91425" tIns="91425" rIns="91425" bIns="91425" anchor="t" anchorCtr="0">
-            <a:noAutofit/>
-          </a:bodyPr>
-          <a:lstStyle/>
-          <a:p>
-            <a:pPr marL="0" lvl="0" indent="0" algn="l" rtl="0">
-              <a:spcBef>
-                <a:spcPts val="0"/>
-              </a:spcBef>
-              <a:spcAft>
-                <a:spcPts val="0"/>
-              </a:spcAft>
-              <a:buNone/>
-            </a:pPr>
-            <a:endParaRPr/>
-          </a:p>
-        </p:txBody>
-      </p:sp>
-    </p:spTree>
-  </p:cSld>
-  <p:clrMapOvr>
-    <a:masterClrMapping/>
-  </p:clrMapOvr>
-</p:notes>
-</file>
-
-<file path=ppt/notesSlides/notesSlide12.xml><?xml version="1.0" encoding="utf-8"?>
-<p:notes xmlns:a="http://schemas.openxmlformats.org/drawingml/2006/main" xmlns:r="http://schemas.openxmlformats.org/officeDocument/2006/relationships" xmlns:p="http://schemas.openxmlformats.org/presentationml/2006/main" showMasterSp="0" showMasterPhAnim="0">
-  <p:cSld>
-    <p:spTree>
-      <p:nvGrpSpPr>
-        <p:cNvPr id="1" name="Shape 348"/>
-        <p:cNvGrpSpPr/>
-        <p:nvPr/>
-      </p:nvGrpSpPr>
-      <p:grpSpPr>
-        <a:xfrm>
-          <a:off x="0" y="0"/>
-          <a:ext cx="0" cy="0"/>
-          <a:chOff x="0" y="0"/>
-          <a:chExt cx="0" cy="0"/>
-        </a:xfrm>
-      </p:grpSpPr>
-      <p:sp>
-        <p:nvSpPr>
-          <p:cNvPr id="349" name="Google Shape;349;g1156f46ef80_0_315:notes"/>
-          <p:cNvSpPr>
-            <a:spLocks noGrp="1" noRot="1" noChangeAspect="1"/>
-          </p:cNvSpPr>
-          <p:nvPr>
-            <p:ph type="sldImg" idx="2"/>
-          </p:nvPr>
-        </p:nvSpPr>
-        <p:spPr>
-          <a:xfrm>
-            <a:off x="381300" y="685800"/>
-            <a:ext cx="6096000" cy="3429000"/>
-          </a:xfrm>
-          <a:custGeom>
-            <a:avLst/>
-            <a:gdLst/>
-            <a:ahLst/>
-            <a:cxnLst/>
-            <a:rect l="l" t="t" r="r" b="b"/>
-            <a:pathLst>
-              <a:path w="120000" h="120000" extrusionOk="0">
-                <a:moveTo>
-                  <a:pt x="0" y="0"/>
-                </a:moveTo>
-                <a:lnTo>
-                  <a:pt x="120000" y="0"/>
-                </a:lnTo>
-                <a:lnTo>
-                  <a:pt x="120000" y="120000"/>
-                </a:lnTo>
-                <a:lnTo>
-                  <a:pt x="0" y="120000"/>
-                </a:lnTo>
-                <a:close/>
-              </a:path>
-            </a:pathLst>
-          </a:custGeom>
-        </p:spPr>
-      </p:sp>
-      <p:sp>
-        <p:nvSpPr>
-          <p:cNvPr id="350" name="Google Shape;350;g1156f46ef80_0_315:notes"/>
           <p:cNvSpPr txBox="1">
             <a:spLocks noGrp="1"/>
           </p:cNvSpPr>
@@ -1677,110 +1676,6 @@
   <p:cSld>
     <p:spTree>
       <p:nvGrpSpPr>
-        <p:cNvPr id="1" name="Shape 384"/>
-        <p:cNvGrpSpPr/>
-        <p:nvPr/>
-      </p:nvGrpSpPr>
-      <p:grpSpPr>
-        <a:xfrm>
-          <a:off x="0" y="0"/>
-          <a:ext cx="0" cy="0"/>
-          <a:chOff x="0" y="0"/>
-          <a:chExt cx="0" cy="0"/>
-        </a:xfrm>
-      </p:grpSpPr>
-      <p:sp>
-        <p:nvSpPr>
-          <p:cNvPr id="385" name="Google Shape;385;g11771f64633_0_39:notes"/>
-          <p:cNvSpPr>
-            <a:spLocks noGrp="1" noRot="1" noChangeAspect="1"/>
-          </p:cNvSpPr>
-          <p:nvPr>
-            <p:ph type="sldImg" idx="2"/>
-          </p:nvPr>
-        </p:nvSpPr>
-        <p:spPr>
-          <a:xfrm>
-            <a:off x="381300" y="685800"/>
-            <a:ext cx="6096000" cy="3429000"/>
-          </a:xfrm>
-          <a:custGeom>
-            <a:avLst/>
-            <a:gdLst/>
-            <a:ahLst/>
-            <a:cxnLst/>
-            <a:rect l="l" t="t" r="r" b="b"/>
-            <a:pathLst>
-              <a:path w="120000" h="120000" extrusionOk="0">
-                <a:moveTo>
-                  <a:pt x="0" y="0"/>
-                </a:moveTo>
-                <a:lnTo>
-                  <a:pt x="120000" y="0"/>
-                </a:lnTo>
-                <a:lnTo>
-                  <a:pt x="120000" y="120000"/>
-                </a:lnTo>
-                <a:lnTo>
-                  <a:pt x="0" y="120000"/>
-                </a:lnTo>
-                <a:close/>
-              </a:path>
-            </a:pathLst>
-          </a:custGeom>
-        </p:spPr>
-      </p:sp>
-      <p:sp>
-        <p:nvSpPr>
-          <p:cNvPr id="386" name="Google Shape;386;g11771f64633_0_39:notes"/>
-          <p:cNvSpPr txBox="1">
-            <a:spLocks noGrp="1"/>
-          </p:cNvSpPr>
-          <p:nvPr>
-            <p:ph type="body" idx="1"/>
-          </p:nvPr>
-        </p:nvSpPr>
-        <p:spPr>
-          <a:xfrm>
-            <a:off x="685800" y="4343400"/>
-            <a:ext cx="5486400" cy="4114800"/>
-          </a:xfrm>
-          <a:prstGeom prst="rect">
-            <a:avLst/>
-          </a:prstGeom>
-        </p:spPr>
-        <p:txBody>
-          <a:bodyPr spcFirstLastPara="1" wrap="square" lIns="91425" tIns="91425" rIns="91425" bIns="91425" anchor="t" anchorCtr="0">
-            <a:noAutofit/>
-          </a:bodyPr>
-          <a:lstStyle/>
-          <a:p>
-            <a:pPr marL="0" lvl="0" indent="0" algn="l" rtl="0">
-              <a:spcBef>
-                <a:spcPts val="0"/>
-              </a:spcBef>
-              <a:spcAft>
-                <a:spcPts val="0"/>
-              </a:spcAft>
-              <a:buNone/>
-            </a:pPr>
-            <a:endParaRPr/>
-          </a:p>
-        </p:txBody>
-      </p:sp>
-    </p:spTree>
-  </p:cSld>
-  <p:clrMapOvr>
-    <a:masterClrMapping/>
-  </p:clrMapOvr>
-</p:notes>
-</file>
-
-<file path=ppt/notesSlides/notesSlide19.xml><?xml version="1.0" encoding="utf-8"?>
-<p:notes xmlns:a="http://schemas.openxmlformats.org/drawingml/2006/main" xmlns:r="http://schemas.openxmlformats.org/officeDocument/2006/relationships" xmlns:p="http://schemas.openxmlformats.org/presentationml/2006/main" showMasterSp="0" showMasterPhAnim="0">
-  <p:cSld>
-    <p:spTree>
-      <p:nvGrpSpPr>
         <p:cNvPr id="1" name="Shape 389"/>
         <p:cNvGrpSpPr/>
         <p:nvPr/>
@@ -1837,6 +1732,110 @@
       <p:sp>
         <p:nvSpPr>
           <p:cNvPr id="391" name="Google Shape;391;g11771f64633_0_44:notes"/>
+          <p:cNvSpPr txBox="1">
+            <a:spLocks noGrp="1"/>
+          </p:cNvSpPr>
+          <p:nvPr>
+            <p:ph type="body" idx="1"/>
+          </p:nvPr>
+        </p:nvSpPr>
+        <p:spPr>
+          <a:xfrm>
+            <a:off x="685800" y="4343400"/>
+            <a:ext cx="5486400" cy="4114800"/>
+          </a:xfrm>
+          <a:prstGeom prst="rect">
+            <a:avLst/>
+          </a:prstGeom>
+        </p:spPr>
+        <p:txBody>
+          <a:bodyPr spcFirstLastPara="1" wrap="square" lIns="91425" tIns="91425" rIns="91425" bIns="91425" anchor="t" anchorCtr="0">
+            <a:noAutofit/>
+          </a:bodyPr>
+          <a:lstStyle/>
+          <a:p>
+            <a:pPr marL="0" lvl="0" indent="0" algn="l" rtl="0">
+              <a:spcBef>
+                <a:spcPts val="0"/>
+              </a:spcBef>
+              <a:spcAft>
+                <a:spcPts val="0"/>
+              </a:spcAft>
+              <a:buNone/>
+            </a:pPr>
+            <a:endParaRPr/>
+          </a:p>
+        </p:txBody>
+      </p:sp>
+    </p:spTree>
+  </p:cSld>
+  <p:clrMapOvr>
+    <a:masterClrMapping/>
+  </p:clrMapOvr>
+</p:notes>
+</file>
+
+<file path=ppt/notesSlides/notesSlide19.xml><?xml version="1.0" encoding="utf-8"?>
+<p:notes xmlns:a="http://schemas.openxmlformats.org/drawingml/2006/main" xmlns:r="http://schemas.openxmlformats.org/officeDocument/2006/relationships" xmlns:p="http://schemas.openxmlformats.org/presentationml/2006/main" showMasterSp="0" showMasterPhAnim="0">
+  <p:cSld>
+    <p:spTree>
+      <p:nvGrpSpPr>
+        <p:cNvPr id="1" name="Shape 395"/>
+        <p:cNvGrpSpPr/>
+        <p:nvPr/>
+      </p:nvGrpSpPr>
+      <p:grpSpPr>
+        <a:xfrm>
+          <a:off x="0" y="0"/>
+          <a:ext cx="0" cy="0"/>
+          <a:chOff x="0" y="0"/>
+          <a:chExt cx="0" cy="0"/>
+        </a:xfrm>
+      </p:grpSpPr>
+      <p:sp>
+        <p:nvSpPr>
+          <p:cNvPr id="396" name="Google Shape;396;g11771f64633_0_50:notes"/>
+          <p:cNvSpPr>
+            <a:spLocks noGrp="1" noRot="1" noChangeAspect="1"/>
+          </p:cNvSpPr>
+          <p:nvPr>
+            <p:ph type="sldImg" idx="2"/>
+          </p:nvPr>
+        </p:nvSpPr>
+        <p:spPr>
+          <a:xfrm>
+            <a:off x="381300" y="685800"/>
+            <a:ext cx="6096000" cy="3429000"/>
+          </a:xfrm>
+          <a:custGeom>
+            <a:avLst/>
+            <a:gdLst/>
+            <a:ahLst/>
+            <a:cxnLst/>
+            <a:rect l="l" t="t" r="r" b="b"/>
+            <a:pathLst>
+              <a:path w="120000" h="120000" extrusionOk="0">
+                <a:moveTo>
+                  <a:pt x="0" y="0"/>
+                </a:moveTo>
+                <a:lnTo>
+                  <a:pt x="120000" y="0"/>
+                </a:lnTo>
+                <a:lnTo>
+                  <a:pt x="120000" y="120000"/>
+                </a:lnTo>
+                <a:lnTo>
+                  <a:pt x="0" y="120000"/>
+                </a:lnTo>
+                <a:close/>
+              </a:path>
+            </a:pathLst>
+          </a:custGeom>
+        </p:spPr>
+      </p:sp>
+      <p:sp>
+        <p:nvSpPr>
+          <p:cNvPr id="397" name="Google Shape;397;g11771f64633_0_50:notes"/>
           <p:cNvSpPr txBox="1">
             <a:spLocks noGrp="1"/>
           </p:cNvSpPr>
@@ -1989,110 +1988,6 @@
   <p:cSld>
     <p:spTree>
       <p:nvGrpSpPr>
-        <p:cNvPr id="1" name="Shape 395"/>
-        <p:cNvGrpSpPr/>
-        <p:nvPr/>
-      </p:nvGrpSpPr>
-      <p:grpSpPr>
-        <a:xfrm>
-          <a:off x="0" y="0"/>
-          <a:ext cx="0" cy="0"/>
-          <a:chOff x="0" y="0"/>
-          <a:chExt cx="0" cy="0"/>
-        </a:xfrm>
-      </p:grpSpPr>
-      <p:sp>
-        <p:nvSpPr>
-          <p:cNvPr id="396" name="Google Shape;396;g11771f64633_0_50:notes"/>
-          <p:cNvSpPr>
-            <a:spLocks noGrp="1" noRot="1" noChangeAspect="1"/>
-          </p:cNvSpPr>
-          <p:nvPr>
-            <p:ph type="sldImg" idx="2"/>
-          </p:nvPr>
-        </p:nvSpPr>
-        <p:spPr>
-          <a:xfrm>
-            <a:off x="381300" y="685800"/>
-            <a:ext cx="6096000" cy="3429000"/>
-          </a:xfrm>
-          <a:custGeom>
-            <a:avLst/>
-            <a:gdLst/>
-            <a:ahLst/>
-            <a:cxnLst/>
-            <a:rect l="l" t="t" r="r" b="b"/>
-            <a:pathLst>
-              <a:path w="120000" h="120000" extrusionOk="0">
-                <a:moveTo>
-                  <a:pt x="0" y="0"/>
-                </a:moveTo>
-                <a:lnTo>
-                  <a:pt x="120000" y="0"/>
-                </a:lnTo>
-                <a:lnTo>
-                  <a:pt x="120000" y="120000"/>
-                </a:lnTo>
-                <a:lnTo>
-                  <a:pt x="0" y="120000"/>
-                </a:lnTo>
-                <a:close/>
-              </a:path>
-            </a:pathLst>
-          </a:custGeom>
-        </p:spPr>
-      </p:sp>
-      <p:sp>
-        <p:nvSpPr>
-          <p:cNvPr id="397" name="Google Shape;397;g11771f64633_0_50:notes"/>
-          <p:cNvSpPr txBox="1">
-            <a:spLocks noGrp="1"/>
-          </p:cNvSpPr>
-          <p:nvPr>
-            <p:ph type="body" idx="1"/>
-          </p:nvPr>
-        </p:nvSpPr>
-        <p:spPr>
-          <a:xfrm>
-            <a:off x="685800" y="4343400"/>
-            <a:ext cx="5486400" cy="4114800"/>
-          </a:xfrm>
-          <a:prstGeom prst="rect">
-            <a:avLst/>
-          </a:prstGeom>
-        </p:spPr>
-        <p:txBody>
-          <a:bodyPr spcFirstLastPara="1" wrap="square" lIns="91425" tIns="91425" rIns="91425" bIns="91425" anchor="t" anchorCtr="0">
-            <a:noAutofit/>
-          </a:bodyPr>
-          <a:lstStyle/>
-          <a:p>
-            <a:pPr marL="0" lvl="0" indent="0" algn="l" rtl="0">
-              <a:spcBef>
-                <a:spcPts val="0"/>
-              </a:spcBef>
-              <a:spcAft>
-                <a:spcPts val="0"/>
-              </a:spcAft>
-              <a:buNone/>
-            </a:pPr>
-            <a:endParaRPr/>
-          </a:p>
-        </p:txBody>
-      </p:sp>
-    </p:spTree>
-  </p:cSld>
-  <p:clrMapOvr>
-    <a:masterClrMapping/>
-  </p:clrMapOvr>
-</p:notes>
-</file>
-
-<file path=ppt/notesSlides/notesSlide21.xml><?xml version="1.0" encoding="utf-8"?>
-<p:notes xmlns:a="http://schemas.openxmlformats.org/drawingml/2006/main" xmlns:r="http://schemas.openxmlformats.org/officeDocument/2006/relationships" xmlns:p="http://schemas.openxmlformats.org/presentationml/2006/main" showMasterSp="0" showMasterPhAnim="0">
-  <p:cSld>
-    <p:spTree>
-      <p:nvGrpSpPr>
         <p:cNvPr id="1" name="Shape 401"/>
         <p:cNvGrpSpPr/>
         <p:nvPr/>
@@ -2192,7 +2087,7 @@
 </p:notes>
 </file>
 
-<file path=ppt/notesSlides/notesSlide22.xml><?xml version="1.0" encoding="utf-8"?>
+<file path=ppt/notesSlides/notesSlide21.xml><?xml version="1.0" encoding="utf-8"?>
 <p:notes xmlns:a="http://schemas.openxmlformats.org/drawingml/2006/main" xmlns:r="http://schemas.openxmlformats.org/officeDocument/2006/relationships" xmlns:p="http://schemas.openxmlformats.org/presentationml/2006/main" showMasterSp="0" showMasterPhAnim="0">
   <p:cSld>
     <p:spTree>
@@ -2949,7 +2844,7 @@
         </p:nvSpPr>
         <p:spPr>
           <a:xfrm>
-            <a:off x="381300" y="685800"/>
+            <a:off x="381000" y="685800"/>
             <a:ext cx="6096000" cy="3429000"/>
           </a:xfrm>
           <a:custGeom>
@@ -17006,6 +16901,44 @@
           </a:p>
         </p:txBody>
       </p:sp>
+      <p:sp>
+        <p:nvSpPr>
+          <p:cNvPr id="5" name="TextBox 4">
+            <a:extLst>
+              <a:ext uri="{FF2B5EF4-FFF2-40B4-BE49-F238E27FC236}">
+                <a16:creationId xmlns:a16="http://schemas.microsoft.com/office/drawing/2014/main" id="{AD916D95-998E-4801-83DC-6CE6B00C9A30}"/>
+              </a:ext>
+            </a:extLst>
+          </p:cNvPr>
+          <p:cNvSpPr txBox="1"/>
+          <p:nvPr/>
+        </p:nvSpPr>
+        <p:spPr>
+          <a:xfrm>
+            <a:off x="2286000" y="2419594"/>
+            <a:ext cx="4572000" cy="307777"/>
+          </a:xfrm>
+          <a:prstGeom prst="rect">
+            <a:avLst/>
+          </a:prstGeom>
+          <a:noFill/>
+        </p:spPr>
+        <p:txBody>
+          <a:bodyPr wrap="square">
+            <a:spAutoFit/>
+          </a:bodyPr>
+          <a:lstStyle/>
+          <a:p>
+            <a:r>
+              <a:rPr lang="en-US" b="0" dirty="0">
+                <a:effectLst/>
+              </a:rPr>
+              <a:t> </a:t>
+            </a:r>
+            <a:endParaRPr lang="en-US" dirty="0"/>
+          </a:p>
+        </p:txBody>
+      </p:sp>
     </p:spTree>
   </p:cSld>
   <p:clrMapOvr>
@@ -17142,111 +17075,6 @@
   <p:cSld>
     <p:spTree>
       <p:nvGrpSpPr>
-        <p:cNvPr id="1" name="Shape 345"/>
-        <p:cNvGrpSpPr/>
-        <p:nvPr/>
-      </p:nvGrpSpPr>
-      <p:grpSpPr>
-        <a:xfrm>
-          <a:off x="0" y="0"/>
-          <a:ext cx="0" cy="0"/>
-          <a:chOff x="0" y="0"/>
-          <a:chExt cx="0" cy="0"/>
-        </a:xfrm>
-      </p:grpSpPr>
-      <p:sp>
-        <p:nvSpPr>
-          <p:cNvPr id="346" name="Google Shape;346;p23"/>
-          <p:cNvSpPr txBox="1">
-            <a:spLocks noGrp="1"/>
-          </p:cNvSpPr>
-          <p:nvPr>
-            <p:ph type="title"/>
-          </p:nvPr>
-        </p:nvSpPr>
-        <p:spPr>
-          <a:xfrm>
-            <a:off x="1303800" y="598575"/>
-            <a:ext cx="7030500" cy="999300"/>
-          </a:xfrm>
-          <a:prstGeom prst="rect">
-            <a:avLst/>
-          </a:prstGeom>
-        </p:spPr>
-        <p:txBody>
-          <a:bodyPr spcFirstLastPara="1" wrap="square" lIns="91425" tIns="91425" rIns="91425" bIns="91425" anchor="t" anchorCtr="0">
-            <a:normAutofit/>
-          </a:bodyPr>
-          <a:lstStyle/>
-          <a:p>
-            <a:pPr marL="0" lvl="0" indent="0" algn="l" rtl="0">
-              <a:spcBef>
-                <a:spcPts val="0"/>
-              </a:spcBef>
-              <a:spcAft>
-                <a:spcPts val="0"/>
-              </a:spcAft>
-              <a:buNone/>
-            </a:pPr>
-            <a:r>
-              <a:rPr lang="en"/>
-              <a:t>Machine Learning (insert here)</a:t>
-            </a:r>
-            <a:endParaRPr/>
-          </a:p>
-        </p:txBody>
-      </p:sp>
-      <p:sp>
-        <p:nvSpPr>
-          <p:cNvPr id="347" name="Google Shape;347;p23"/>
-          <p:cNvSpPr txBox="1">
-            <a:spLocks noGrp="1"/>
-          </p:cNvSpPr>
-          <p:nvPr>
-            <p:ph type="body" idx="1"/>
-          </p:nvPr>
-        </p:nvSpPr>
-        <p:spPr>
-          <a:xfrm>
-            <a:off x="1303800" y="1990050"/>
-            <a:ext cx="7030500" cy="2541600"/>
-          </a:xfrm>
-          <a:prstGeom prst="rect">
-            <a:avLst/>
-          </a:prstGeom>
-        </p:spPr>
-        <p:txBody>
-          <a:bodyPr spcFirstLastPara="1" wrap="square" lIns="91425" tIns="91425" rIns="91425" bIns="91425" anchor="t" anchorCtr="0">
-            <a:normAutofit/>
-          </a:bodyPr>
-          <a:lstStyle/>
-          <a:p>
-            <a:pPr marL="0" lvl="0" indent="0" algn="l" rtl="0">
-              <a:spcBef>
-                <a:spcPts val="0"/>
-              </a:spcBef>
-              <a:spcAft>
-                <a:spcPts val="1200"/>
-              </a:spcAft>
-              <a:buNone/>
-            </a:pPr>
-            <a:endParaRPr/>
-          </a:p>
-        </p:txBody>
-      </p:sp>
-    </p:spTree>
-  </p:cSld>
-  <p:clrMapOvr>
-    <a:masterClrMapping/>
-  </p:clrMapOvr>
-</p:sld>
-</file>
-
-<file path=ppt/slides/slide12.xml><?xml version="1.0" encoding="utf-8"?>
-<p:sld xmlns:a="http://schemas.openxmlformats.org/drawingml/2006/main" xmlns:r="http://schemas.openxmlformats.org/officeDocument/2006/relationships" xmlns:p="http://schemas.openxmlformats.org/presentationml/2006/main">
-  <p:cSld>
-    <p:spTree>
-      <p:nvGrpSpPr>
         <p:cNvPr id="1" name="Shape 351"/>
         <p:cNvGrpSpPr/>
         <p:nvPr/>
@@ -17294,10 +17122,10 @@
               <a:buNone/>
             </a:pPr>
             <a:r>
-              <a:rPr lang="en"/>
-              <a:t>Machine Learning Results (insert here)</a:t>
+              <a:rPr lang="en" dirty="0"/>
+              <a:t>Machine Learning</a:t>
             </a:r>
-            <a:endParaRPr/>
+            <a:endParaRPr dirty="0"/>
           </a:p>
         </p:txBody>
       </p:sp>
@@ -17322,6 +17150,162 @@
         </p:spPr>
         <p:txBody>
           <a:bodyPr spcFirstLastPara="1" wrap="square" lIns="91425" tIns="91425" rIns="91425" bIns="91425" anchor="t" anchorCtr="0">
+            <a:normAutofit fontScale="85000" lnSpcReduction="10000"/>
+          </a:bodyPr>
+          <a:lstStyle/>
+          <a:p>
+            <a:pPr marL="146050" indent="0" algn="ctr" rtl="0">
+              <a:spcBef>
+                <a:spcPts val="0"/>
+              </a:spcBef>
+              <a:spcAft>
+                <a:spcPts val="1200"/>
+              </a:spcAft>
+              <a:buNone/>
+            </a:pPr>
+            <a:r>
+              <a:rPr lang="en-US" sz="1800" b="0" i="0" u="none" strike="noStrike" dirty="0">
+                <a:solidFill>
+                  <a:srgbClr val="424242"/>
+                </a:solidFill>
+                <a:effectLst/>
+                <a:latin typeface="Nunito" pitchFamily="2" charset="0"/>
+              </a:rPr>
+              <a:t>Multiple Linear Regression, Lasso Regression, Ridge Regression</a:t>
+            </a:r>
+            <a:endParaRPr lang="en-US" b="0" dirty="0">
+              <a:effectLst/>
+            </a:endParaRPr>
+          </a:p>
+          <a:p>
+            <a:pPr marL="146050" indent="0" rtl="0">
+              <a:spcBef>
+                <a:spcPts val="0"/>
+              </a:spcBef>
+              <a:spcAft>
+                <a:spcPts val="1200"/>
+              </a:spcAft>
+              <a:buNone/>
+            </a:pPr>
+            <a:r>
+              <a:rPr lang="en-US" sz="1800" b="0" i="0" u="none" strike="noStrike" dirty="0">
+                <a:solidFill>
+                  <a:srgbClr val="424242"/>
+                </a:solidFill>
+                <a:effectLst/>
+                <a:latin typeface="Nunito" pitchFamily="2" charset="0"/>
+              </a:rPr>
+              <a:t>Linear regression- provides a good sense of whether model is suffering from over or under-fitting. </a:t>
+            </a:r>
+            <a:endParaRPr lang="en-US" b="0" dirty="0">
+              <a:effectLst/>
+            </a:endParaRPr>
+          </a:p>
+          <a:p>
+            <a:pPr marL="146050" indent="0" rtl="0">
+              <a:spcBef>
+                <a:spcPts val="0"/>
+              </a:spcBef>
+              <a:spcAft>
+                <a:spcPts val="1200"/>
+              </a:spcAft>
+              <a:buNone/>
+            </a:pPr>
+            <a:r>
+              <a:rPr lang="en-US" sz="1800" b="0" i="0" u="none" strike="noStrike" dirty="0">
+                <a:solidFill>
+                  <a:srgbClr val="424242"/>
+                </a:solidFill>
+                <a:effectLst/>
+                <a:latin typeface="Nunito" pitchFamily="2" charset="0"/>
+              </a:rPr>
+              <a:t>Ridge-helps reduce model complexity and multi-collinearity</a:t>
+            </a:r>
+            <a:endParaRPr lang="en-US" b="0" dirty="0">
+              <a:effectLst/>
+            </a:endParaRPr>
+          </a:p>
+          <a:p>
+            <a:pPr marL="146050" indent="0" rtl="0">
+              <a:spcBef>
+                <a:spcPts val="0"/>
+              </a:spcBef>
+              <a:spcAft>
+                <a:spcPts val="1200"/>
+              </a:spcAft>
+              <a:buNone/>
+            </a:pPr>
+            <a:r>
+              <a:rPr lang="en-US" sz="1800" b="0" i="0" u="none" strike="noStrike" dirty="0">
+                <a:solidFill>
+                  <a:srgbClr val="424242"/>
+                </a:solidFill>
+                <a:effectLst/>
+                <a:latin typeface="Nunito" pitchFamily="2" charset="0"/>
+              </a:rPr>
+              <a:t>Lasso-helps reduce over-fitting and can also help with feature selection</a:t>
+            </a:r>
+            <a:endParaRPr lang="en-US" b="0" dirty="0">
+              <a:effectLst/>
+            </a:endParaRPr>
+          </a:p>
+          <a:p>
+            <a:pPr marL="146050" indent="0">
+              <a:buNone/>
+            </a:pPr>
+            <a:br>
+              <a:rPr lang="en-US" dirty="0"/>
+            </a:br>
+            <a:endParaRPr dirty="0"/>
+          </a:p>
+        </p:txBody>
+      </p:sp>
+    </p:spTree>
+  </p:cSld>
+  <p:clrMapOvr>
+    <a:masterClrMapping/>
+  </p:clrMapOvr>
+</p:sld>
+</file>
+
+<file path=ppt/slides/slide12.xml><?xml version="1.0" encoding="utf-8"?>
+<p:sld xmlns:a="http://schemas.openxmlformats.org/drawingml/2006/main" xmlns:r="http://schemas.openxmlformats.org/officeDocument/2006/relationships" xmlns:p="http://schemas.openxmlformats.org/presentationml/2006/main">
+  <p:cSld>
+    <p:spTree>
+      <p:nvGrpSpPr>
+        <p:cNvPr id="1" name="Shape 345"/>
+        <p:cNvGrpSpPr/>
+        <p:nvPr/>
+      </p:nvGrpSpPr>
+      <p:grpSpPr>
+        <a:xfrm>
+          <a:off x="0" y="0"/>
+          <a:ext cx="0" cy="0"/>
+          <a:chOff x="0" y="0"/>
+          <a:chExt cx="0" cy="0"/>
+        </a:xfrm>
+      </p:grpSpPr>
+      <p:sp>
+        <p:nvSpPr>
+          <p:cNvPr id="346" name="Google Shape;346;p23"/>
+          <p:cNvSpPr txBox="1">
+            <a:spLocks noGrp="1"/>
+          </p:cNvSpPr>
+          <p:nvPr>
+            <p:ph type="title"/>
+          </p:nvPr>
+        </p:nvSpPr>
+        <p:spPr>
+          <a:xfrm>
+            <a:off x="1303800" y="598575"/>
+            <a:ext cx="7030500" cy="800734"/>
+          </a:xfrm>
+          <a:prstGeom prst="rect">
+            <a:avLst/>
+          </a:prstGeom>
+        </p:spPr>
+        <p:txBody>
+          <a:bodyPr spcFirstLastPara="1" wrap="square" lIns="91425" tIns="91425" rIns="91425" bIns="91425" anchor="t" anchorCtr="0">
             <a:normAutofit/>
           </a:bodyPr>
           <a:lstStyle/>
@@ -17331,14 +17315,65 @@
                 <a:spcPts val="0"/>
               </a:spcBef>
               <a:spcAft>
-                <a:spcPts val="1200"/>
+                <a:spcPts val="0"/>
               </a:spcAft>
               <a:buNone/>
             </a:pPr>
-            <a:endParaRPr/>
+            <a:r>
+              <a:rPr lang="en" dirty="0"/>
+              <a:t>Machine Learning Results</a:t>
+            </a:r>
+            <a:endParaRPr dirty="0"/>
           </a:p>
         </p:txBody>
       </p:sp>
+      <p:pic>
+        <p:nvPicPr>
+          <p:cNvPr id="1026" name="Picture 2">
+            <a:extLst>
+              <a:ext uri="{FF2B5EF4-FFF2-40B4-BE49-F238E27FC236}">
+                <a16:creationId xmlns:a16="http://schemas.microsoft.com/office/drawing/2014/main" id="{6CBB0CD0-3C30-4F13-906A-51322E9B5A93}"/>
+              </a:ext>
+            </a:extLst>
+          </p:cNvPr>
+          <p:cNvPicPr>
+            <a:picLocks noChangeAspect="1" noChangeArrowheads="1"/>
+          </p:cNvPicPr>
+          <p:nvPr/>
+        </p:nvPicPr>
+        <p:blipFill>
+          <a:blip r:embed="rId3">
+            <a:extLst>
+              <a:ext uri="{28A0092B-C50C-407E-A947-70E740481C1C}">
+                <a14:useLocalDpi xmlns:a14="http://schemas.microsoft.com/office/drawing/2010/main" val="0"/>
+              </a:ext>
+            </a:extLst>
+          </a:blip>
+          <a:srcRect/>
+          <a:stretch>
+            <a:fillRect/>
+          </a:stretch>
+        </p:blipFill>
+        <p:spPr bwMode="auto">
+          <a:xfrm>
+            <a:off x="1976438" y="1468582"/>
+            <a:ext cx="5191125" cy="3517756"/>
+          </a:xfrm>
+          <a:prstGeom prst="rect">
+            <a:avLst/>
+          </a:prstGeom>
+          <a:noFill/>
+          <a:extLst>
+            <a:ext uri="{909E8E84-426E-40DD-AFC4-6F175D3DCCD1}">
+              <a14:hiddenFill xmlns:a14="http://schemas.microsoft.com/office/drawing/2010/main">
+                <a:solidFill>
+                  <a:srgbClr val="FFFFFF"/>
+                </a:solidFill>
+              </a14:hiddenFill>
+            </a:ext>
+          </a:extLst>
+        </p:spPr>
+      </p:pic>
     </p:spTree>
   </p:cSld>
   <p:clrMapOvr>
@@ -17880,74 +17915,6 @@
   <p:cSld>
     <p:spTree>
       <p:nvGrpSpPr>
-        <p:cNvPr id="1" name="Shape 387"/>
-        <p:cNvGrpSpPr/>
-        <p:nvPr/>
-      </p:nvGrpSpPr>
-      <p:grpSpPr>
-        <a:xfrm>
-          <a:off x="0" y="0"/>
-          <a:ext cx="0" cy="0"/>
-          <a:chOff x="0" y="0"/>
-          <a:chExt cx="0" cy="0"/>
-        </a:xfrm>
-      </p:grpSpPr>
-      <p:sp>
-        <p:nvSpPr>
-          <p:cNvPr id="388" name="Google Shape;388;p30"/>
-          <p:cNvSpPr txBox="1">
-            <a:spLocks noGrp="1"/>
-          </p:cNvSpPr>
-          <p:nvPr>
-            <p:ph type="title"/>
-          </p:nvPr>
-        </p:nvSpPr>
-        <p:spPr>
-          <a:xfrm>
-            <a:off x="1303800" y="598575"/>
-            <a:ext cx="7030500" cy="999300"/>
-          </a:xfrm>
-          <a:prstGeom prst="rect">
-            <a:avLst/>
-          </a:prstGeom>
-        </p:spPr>
-        <p:txBody>
-          <a:bodyPr spcFirstLastPara="1" wrap="square" lIns="91425" tIns="91425" rIns="91425" bIns="91425" anchor="t" anchorCtr="0">
-            <a:normAutofit/>
-          </a:bodyPr>
-          <a:lstStyle/>
-          <a:p>
-            <a:pPr marL="0" lvl="0" indent="0" algn="l" rtl="0">
-              <a:spcBef>
-                <a:spcPts val="0"/>
-              </a:spcBef>
-              <a:spcAft>
-                <a:spcPts val="0"/>
-              </a:spcAft>
-              <a:buSzPts val="990"/>
-              <a:buNone/>
-            </a:pPr>
-            <a:r>
-              <a:rPr lang="en" sz="2420"/>
-              <a:t>Visualization (Model Map)</a:t>
-            </a:r>
-            <a:endParaRPr sz="2420"/>
-          </a:p>
-        </p:txBody>
-      </p:sp>
-    </p:spTree>
-  </p:cSld>
-  <p:clrMapOvr>
-    <a:masterClrMapping/>
-  </p:clrMapOvr>
-</p:sld>
-</file>
-
-<file path=ppt/slides/slide19.xml><?xml version="1.0" encoding="utf-8"?>
-<p:sld xmlns:a="http://schemas.openxmlformats.org/drawingml/2006/main" xmlns:r="http://schemas.openxmlformats.org/officeDocument/2006/relationships" xmlns:p="http://schemas.openxmlformats.org/presentationml/2006/main">
-  <p:cSld>
-    <p:spTree>
-      <p:nvGrpSpPr>
         <p:cNvPr id="1" name="Shape 392"/>
         <p:cNvGrpSpPr/>
         <p:nvPr/>
@@ -18038,6 +18005,119 @@
           <a:xfrm>
             <a:off x="1617250" y="1597875"/>
             <a:ext cx="5909503" cy="3240824"/>
+          </a:xfrm>
+          <a:prstGeom prst="rect">
+            <a:avLst/>
+          </a:prstGeom>
+          <a:noFill/>
+          <a:ln>
+            <a:noFill/>
+          </a:ln>
+        </p:spPr>
+      </p:pic>
+    </p:spTree>
+  </p:cSld>
+  <p:clrMapOvr>
+    <a:masterClrMapping/>
+  </p:clrMapOvr>
+</p:sld>
+</file>
+
+<file path=ppt/slides/slide19.xml><?xml version="1.0" encoding="utf-8"?>
+<p:sld xmlns:a="http://schemas.openxmlformats.org/drawingml/2006/main" xmlns:r="http://schemas.openxmlformats.org/officeDocument/2006/relationships" xmlns:p="http://schemas.openxmlformats.org/presentationml/2006/main">
+  <p:cSld>
+    <p:spTree>
+      <p:nvGrpSpPr>
+        <p:cNvPr id="1" name="Shape 398"/>
+        <p:cNvGrpSpPr/>
+        <p:nvPr/>
+      </p:nvGrpSpPr>
+      <p:grpSpPr>
+        <a:xfrm>
+          <a:off x="0" y="0"/>
+          <a:ext cx="0" cy="0"/>
+          <a:chOff x="0" y="0"/>
+          <a:chExt cx="0" cy="0"/>
+        </a:xfrm>
+      </p:grpSpPr>
+      <p:sp>
+        <p:nvSpPr>
+          <p:cNvPr id="399" name="Google Shape;399;p32"/>
+          <p:cNvSpPr txBox="1">
+            <a:spLocks noGrp="1"/>
+          </p:cNvSpPr>
+          <p:nvPr>
+            <p:ph type="title"/>
+          </p:nvPr>
+        </p:nvSpPr>
+        <p:spPr>
+          <a:xfrm>
+            <a:off x="1303800" y="598575"/>
+            <a:ext cx="7030500" cy="999300"/>
+          </a:xfrm>
+          <a:prstGeom prst="rect">
+            <a:avLst/>
+          </a:prstGeom>
+        </p:spPr>
+        <p:txBody>
+          <a:bodyPr spcFirstLastPara="1" wrap="square" lIns="91425" tIns="91425" rIns="91425" bIns="91425" anchor="t" anchorCtr="0">
+            <a:normAutofit/>
+          </a:bodyPr>
+          <a:lstStyle/>
+          <a:p>
+            <a:pPr marL="0" lvl="0" indent="0" algn="l" rtl="0">
+              <a:spcBef>
+                <a:spcPts val="0"/>
+              </a:spcBef>
+              <a:spcAft>
+                <a:spcPts val="0"/>
+              </a:spcAft>
+              <a:buSzPts val="990"/>
+              <a:buNone/>
+            </a:pPr>
+            <a:r>
+              <a:rPr lang="en" sz="2420"/>
+              <a:t>Visualization (Potential Data Sets for Model)</a:t>
+            </a:r>
+            <a:endParaRPr sz="2420"/>
+          </a:p>
+          <a:p>
+            <a:pPr marL="0" lvl="0" indent="0" algn="ctr" rtl="0">
+              <a:spcBef>
+                <a:spcPts val="0"/>
+              </a:spcBef>
+              <a:spcAft>
+                <a:spcPts val="0"/>
+              </a:spcAft>
+              <a:buSzPts val="990"/>
+              <a:buNone/>
+            </a:pPr>
+            <a:r>
+              <a:rPr lang="en" sz="1520"/>
+              <a:t>Veterans Per State by Race</a:t>
+            </a:r>
+            <a:endParaRPr sz="1520"/>
+          </a:p>
+        </p:txBody>
+      </p:sp>
+      <p:pic>
+        <p:nvPicPr>
+          <p:cNvPr id="400" name="Google Shape;400;p32"/>
+          <p:cNvPicPr preferRelativeResize="0"/>
+          <p:nvPr/>
+        </p:nvPicPr>
+        <p:blipFill>
+          <a:blip r:embed="rId3">
+            <a:alphaModFix/>
+          </a:blip>
+          <a:stretch>
+            <a:fillRect/>
+          </a:stretch>
+        </p:blipFill>
+        <p:spPr>
+          <a:xfrm>
+            <a:off x="1588188" y="1630475"/>
+            <a:ext cx="5967616" cy="3240825"/>
           </a:xfrm>
           <a:prstGeom prst="rect">
             <a:avLst/>
@@ -18265,119 +18345,6 @@
   <p:cSld>
     <p:spTree>
       <p:nvGrpSpPr>
-        <p:cNvPr id="1" name="Shape 398"/>
-        <p:cNvGrpSpPr/>
-        <p:nvPr/>
-      </p:nvGrpSpPr>
-      <p:grpSpPr>
-        <a:xfrm>
-          <a:off x="0" y="0"/>
-          <a:ext cx="0" cy="0"/>
-          <a:chOff x="0" y="0"/>
-          <a:chExt cx="0" cy="0"/>
-        </a:xfrm>
-      </p:grpSpPr>
-      <p:sp>
-        <p:nvSpPr>
-          <p:cNvPr id="399" name="Google Shape;399;p32"/>
-          <p:cNvSpPr txBox="1">
-            <a:spLocks noGrp="1"/>
-          </p:cNvSpPr>
-          <p:nvPr>
-            <p:ph type="title"/>
-          </p:nvPr>
-        </p:nvSpPr>
-        <p:spPr>
-          <a:xfrm>
-            <a:off x="1303800" y="598575"/>
-            <a:ext cx="7030500" cy="999300"/>
-          </a:xfrm>
-          <a:prstGeom prst="rect">
-            <a:avLst/>
-          </a:prstGeom>
-        </p:spPr>
-        <p:txBody>
-          <a:bodyPr spcFirstLastPara="1" wrap="square" lIns="91425" tIns="91425" rIns="91425" bIns="91425" anchor="t" anchorCtr="0">
-            <a:normAutofit/>
-          </a:bodyPr>
-          <a:lstStyle/>
-          <a:p>
-            <a:pPr marL="0" lvl="0" indent="0" algn="l" rtl="0">
-              <a:spcBef>
-                <a:spcPts val="0"/>
-              </a:spcBef>
-              <a:spcAft>
-                <a:spcPts val="0"/>
-              </a:spcAft>
-              <a:buSzPts val="990"/>
-              <a:buNone/>
-            </a:pPr>
-            <a:r>
-              <a:rPr lang="en" sz="2420"/>
-              <a:t>Visualization (Potential Data Sets for Model)</a:t>
-            </a:r>
-            <a:endParaRPr sz="2420"/>
-          </a:p>
-          <a:p>
-            <a:pPr marL="0" lvl="0" indent="0" algn="ctr" rtl="0">
-              <a:spcBef>
-                <a:spcPts val="0"/>
-              </a:spcBef>
-              <a:spcAft>
-                <a:spcPts val="0"/>
-              </a:spcAft>
-              <a:buSzPts val="990"/>
-              <a:buNone/>
-            </a:pPr>
-            <a:r>
-              <a:rPr lang="en" sz="1520"/>
-              <a:t>Veterans Per State by Race</a:t>
-            </a:r>
-            <a:endParaRPr sz="1520"/>
-          </a:p>
-        </p:txBody>
-      </p:sp>
-      <p:pic>
-        <p:nvPicPr>
-          <p:cNvPr id="400" name="Google Shape;400;p32"/>
-          <p:cNvPicPr preferRelativeResize="0"/>
-          <p:nvPr/>
-        </p:nvPicPr>
-        <p:blipFill>
-          <a:blip r:embed="rId3">
-            <a:alphaModFix/>
-          </a:blip>
-          <a:stretch>
-            <a:fillRect/>
-          </a:stretch>
-        </p:blipFill>
-        <p:spPr>
-          <a:xfrm>
-            <a:off x="1588188" y="1630475"/>
-            <a:ext cx="5967616" cy="3240825"/>
-          </a:xfrm>
-          <a:prstGeom prst="rect">
-            <a:avLst/>
-          </a:prstGeom>
-          <a:noFill/>
-          <a:ln>
-            <a:noFill/>
-          </a:ln>
-        </p:spPr>
-      </p:pic>
-    </p:spTree>
-  </p:cSld>
-  <p:clrMapOvr>
-    <a:masterClrMapping/>
-  </p:clrMapOvr>
-</p:sld>
-</file>
-
-<file path=ppt/slides/slide21.xml><?xml version="1.0" encoding="utf-8"?>
-<p:sld xmlns:a="http://schemas.openxmlformats.org/drawingml/2006/main" xmlns:r="http://schemas.openxmlformats.org/officeDocument/2006/relationships" xmlns:p="http://schemas.openxmlformats.org/presentationml/2006/main">
-  <p:cSld>
-    <p:spTree>
-      <p:nvGrpSpPr>
         <p:cNvPr id="1" name="Shape 404"/>
         <p:cNvGrpSpPr/>
         <p:nvPr/>
@@ -18486,7 +18453,7 @@
 </p:sld>
 </file>
 
-<file path=ppt/slides/slide22.xml><?xml version="1.0" encoding="utf-8"?>
+<file path=ppt/slides/slide21.xml><?xml version="1.0" encoding="utf-8"?>
 <p:sld xmlns:a="http://schemas.openxmlformats.org/drawingml/2006/main" xmlns:r="http://schemas.openxmlformats.org/officeDocument/2006/relationships" xmlns:p="http://schemas.openxmlformats.org/presentationml/2006/main">
   <p:cSld>
     <p:spTree>
@@ -19502,7 +19469,7 @@
         </p:spPr>
         <p:txBody>
           <a:bodyPr spcFirstLastPara="1" wrap="square" lIns="91425" tIns="91425" rIns="91425" bIns="91425" anchor="t" anchorCtr="0">
-            <a:normAutofit/>
+            <a:normAutofit fontScale="92500" lnSpcReduction="20000"/>
           </a:bodyPr>
           <a:lstStyle/>
           <a:p>

</xml_diff>